<commit_message>
Updates title of strings cheatsheetChanges title of strings cheatsheet to String Manipulation with stringr, substitutes str_glue and str_gle_data for equivalent functions from the glue package.
</commit_message>
<xml_diff>
--- a/powerpoints/strings.pptx
+++ b/powerpoints/strings.pptx
@@ -3759,14 +3759,14 @@
           </a:bodyPr>
           <a:lstStyle/>
           <a:p>
-            <a:pPr defTabSz="566674">
+            <a:pPr>
               <a:lnSpc>
                 <a:spcPct val="80000"/>
               </a:lnSpc>
               <a:spcBef>
                 <a:spcPts val="0"/>
               </a:spcBef>
-              <a:defRPr b="0" sz="1164">
+              <a:defRPr b="0">
                 <a:solidFill>
                   <a:srgbClr val="000000"/>
                 </a:solidFill>
@@ -3786,14 +3786,14 @@
             <a:endParaRPr i="1"/>
           </a:p>
           <a:p>
-            <a:pPr defTabSz="566674">
+            <a:pPr>
               <a:lnSpc>
                 <a:spcPct val="80000"/>
               </a:lnSpc>
               <a:spcBef>
                 <a:spcPts val="0"/>
               </a:spcBef>
-              <a:defRPr b="0" sz="1164">
+              <a:defRPr b="0">
                 <a:solidFill>
                   <a:srgbClr val="000000"/>
                 </a:solidFill>
@@ -3802,14 +3802,14 @@
             <a:endParaRPr i="1"/>
           </a:p>
           <a:p>
-            <a:pPr defTabSz="566674">
+            <a:pPr>
               <a:lnSpc>
                 <a:spcPct val="80000"/>
               </a:lnSpc>
               <a:spcBef>
                 <a:spcPts val="0"/>
               </a:spcBef>
-              <a:defRPr b="0" sz="1164">
+              <a:defRPr b="0">
                 <a:solidFill>
                   <a:srgbClr val="000000"/>
                 </a:solidFill>
@@ -3836,14 +3836,14 @@
             <a:endParaRPr i="1"/>
           </a:p>
           <a:p>
-            <a:pPr defTabSz="566674">
+            <a:pPr>
               <a:lnSpc>
                 <a:spcPct val="80000"/>
               </a:lnSpc>
               <a:spcBef>
                 <a:spcPts val="0"/>
               </a:spcBef>
-              <a:defRPr b="0" sz="1164">
+              <a:defRPr b="0">
                 <a:solidFill>
                   <a:srgbClr val="000000"/>
                 </a:solidFill>
@@ -3852,14 +3852,14 @@
             <a:endParaRPr i="1"/>
           </a:p>
           <a:p>
-            <a:pPr defTabSz="566674">
+            <a:pPr>
               <a:lnSpc>
                 <a:spcPct val="80000"/>
               </a:lnSpc>
               <a:spcBef>
                 <a:spcPts val="0"/>
               </a:spcBef>
-              <a:defRPr b="0" sz="1164">
+              <a:defRPr b="0">
                 <a:solidFill>
                   <a:srgbClr val="000000"/>
                 </a:solidFill>
@@ -3879,14 +3879,14 @@
             <a:endParaRPr i="1"/>
           </a:p>
           <a:p>
-            <a:pPr defTabSz="566674">
+            <a:pPr>
               <a:lnSpc>
                 <a:spcPct val="80000"/>
               </a:lnSpc>
               <a:spcBef>
                 <a:spcPts val="0"/>
               </a:spcBef>
-              <a:defRPr b="0" sz="1164">
+              <a:defRPr b="0">
                 <a:solidFill>
                   <a:srgbClr val="000000"/>
                 </a:solidFill>
@@ -3895,30 +3895,14 @@
             <a:endParaRPr i="1"/>
           </a:p>
           <a:p>
-            <a:pPr defTabSz="566674">
+            <a:pPr>
               <a:lnSpc>
                 <a:spcPct val="80000"/>
               </a:lnSpc>
               <a:spcBef>
                 <a:spcPts val="0"/>
               </a:spcBef>
-              <a:defRPr b="0" sz="1164">
-                <a:solidFill>
-                  <a:srgbClr val="000000"/>
-                </a:solidFill>
-              </a:defRPr>
-            </a:pPr>
-            <a:endParaRPr i="1"/>
-          </a:p>
-          <a:p>
-            <a:pPr defTabSz="566674">
-              <a:lnSpc>
-                <a:spcPct val="80000"/>
-              </a:lnSpc>
-              <a:spcBef>
-                <a:spcPts val="0"/>
-              </a:spcBef>
-              <a:defRPr b="0" sz="1164">
+              <a:defRPr b="0">
                 <a:solidFill>
                   <a:srgbClr val="000000"/>
                 </a:solidFill>
@@ -3954,14 +3938,14 @@
             </a:r>
           </a:p>
           <a:p>
-            <a:pPr defTabSz="566674">
+            <a:pPr>
               <a:lnSpc>
                 <a:spcPct val="80000"/>
               </a:lnSpc>
               <a:spcBef>
                 <a:spcPts val="0"/>
               </a:spcBef>
-              <a:defRPr b="0" sz="1164">
+              <a:defRPr b="0">
                 <a:solidFill>
                   <a:srgbClr val="000000"/>
                 </a:solidFill>
@@ -3974,14 +3958,14 @@
             <a:endParaRPr i="1"/>
           </a:p>
           <a:p>
-            <a:pPr defTabSz="566674">
+            <a:pPr>
               <a:lnSpc>
                 <a:spcPct val="80000"/>
               </a:lnSpc>
               <a:spcBef>
                 <a:spcPts val="0"/>
               </a:spcBef>
-              <a:defRPr b="0" sz="1164">
+              <a:defRPr b="0">
                 <a:solidFill>
                   <a:srgbClr val="000000"/>
                 </a:solidFill>
@@ -3990,56 +3974,41 @@
             <a:endParaRPr i="1"/>
           </a:p>
           <a:p>
-            <a:pPr defTabSz="566674">
+            <a:pPr>
               <a:lnSpc>
                 <a:spcPct val="80000"/>
               </a:lnSpc>
               <a:spcBef>
                 <a:spcPts val="0"/>
               </a:spcBef>
-              <a:defRPr b="0" sz="1164">
+              <a:defRPr b="0">
                 <a:solidFill>
                   <a:srgbClr val="000000"/>
                 </a:solidFill>
               </a:defRPr>
             </a:pPr>
             <a:r>
-              <a:rPr>
-                <a:solidFill>
-                  <a:schemeClr val="accent5">
-                    <a:satOff val="-35908"/>
-                    <a:lumOff val="-17895"/>
-                  </a:schemeClr>
-                </a:solidFill>
-                <a:latin typeface="Source Sans Pro Semibold"/>
-                <a:ea typeface="Source Sans Pro Semibold"/>
-                <a:cs typeface="Source Sans Pro Semibold"/>
-                <a:sym typeface="Source Sans Pro Semibold"/>
-              </a:rPr>
-              <a:t>glue::</a:t>
+              <a:rPr b="1"/>
+              <a:t>str_glue</a:t>
             </a:r>
             <a:r>
-              <a:rPr b="1"/>
-              <a:t>glue</a:t>
-            </a:r>
-            <a:r>
-              <a:t>(..., .sep = "", .envir = parent.frame(), .open = "{", .close = "}") Create a string from strings and {expressions} to evaluate. </a:t>
+              <a:t>(…, .sep = "", .envir = parent.frame()) Create a string from strings and {expressions} to evaluate. </a:t>
             </a:r>
             <a:r>
               <a:rPr i="1"/>
-              <a:t>glue::glue("Pi is {pi}")</a:t>
+              <a:t>str_glue("Pi is {pi}")</a:t>
             </a:r>
             <a:endParaRPr i="1"/>
           </a:p>
           <a:p>
-            <a:pPr defTabSz="566674">
+            <a:pPr>
               <a:lnSpc>
                 <a:spcPct val="80000"/>
               </a:lnSpc>
               <a:spcBef>
                 <a:spcPts val="0"/>
               </a:spcBef>
-              <a:defRPr b="0" sz="1164">
+              <a:defRPr b="0">
                 <a:solidFill>
                   <a:srgbClr val="000000"/>
                 </a:solidFill>
@@ -4048,44 +4017,29 @@
             <a:endParaRPr i="1"/>
           </a:p>
           <a:p>
-            <a:pPr defTabSz="566674">
+            <a:pPr>
               <a:lnSpc>
                 <a:spcPct val="80000"/>
               </a:lnSpc>
               <a:spcBef>
                 <a:spcPts val="0"/>
               </a:spcBef>
-              <a:defRPr b="0" sz="1164">
+              <a:defRPr b="0">
                 <a:solidFill>
                   <a:srgbClr val="000000"/>
                 </a:solidFill>
               </a:defRPr>
             </a:pPr>
             <a:r>
-              <a:rPr>
-                <a:solidFill>
-                  <a:schemeClr val="accent5">
-                    <a:satOff val="-35908"/>
-                    <a:lumOff val="-17895"/>
-                  </a:schemeClr>
-                </a:solidFill>
-                <a:latin typeface="Source Sans Pro Semibold"/>
-                <a:ea typeface="Source Sans Pro Semibold"/>
-                <a:cs typeface="Source Sans Pro Semibold"/>
-                <a:sym typeface="Source Sans Pro Semibold"/>
-              </a:rPr>
-              <a:t>glue::</a:t>
+              <a:rPr b="1"/>
+              <a:t>str_glue_data</a:t>
             </a:r>
             <a:r>
-              <a:rPr b="1"/>
-              <a:t>glue_data</a:t>
-            </a:r>
-            <a:r>
-              <a:t>(.x, ..., .sep = "", .envir = parent.frame(), .open = "{", .close = "}") Use a data frame, list, or environment to create a string from strings and {expressions} to evaluate. </a:t>
+              <a:t>(.x, ..., .sep = "", .envir = parent.frame(), .na = "NA") Use a data frame, list, or environment to create a string from strings and {expressions} to evaluate. </a:t>
             </a:r>
             <a:r>
               <a:rPr i="1"/>
-              <a:t>glue::glue_data(mtcars, "{rownames(mtcars)} has {hp} hp")</a:t>
+              <a:t>str_glue_data(mtcars, "{rownames(mtcars)} has {hp} hp")</a:t>
             </a:r>
           </a:p>
         </p:txBody>
@@ -4098,7 +4052,7 @@
         </p:nvGrpSpPr>
         <p:grpSpPr>
           <a:xfrm>
-            <a:off x="4926257" y="8333564"/>
+            <a:off x="4926257" y="8397064"/>
             <a:ext cx="860184" cy="496993"/>
             <a:chOff x="0" y="0"/>
             <a:chExt cx="860182" cy="496991"/>
@@ -5268,7 +5222,7 @@
         </p:nvGrpSpPr>
         <p:grpSpPr>
           <a:xfrm>
-            <a:off x="4915684" y="7525681"/>
+            <a:off x="4915684" y="7589181"/>
             <a:ext cx="1307359" cy="610730"/>
             <a:chOff x="19050" y="24271"/>
             <a:chExt cx="1307358" cy="610728"/>
@@ -10784,7 +10738,7 @@
       </p:sp>
       <p:sp>
         <p:nvSpPr>
-          <p:cNvPr id="263" name="Work with strings with stringr : : CHEAT SHEET"/>
+          <p:cNvPr id="263" name="String manipulation with stringr : : CHEAT SHEET"/>
           <p:cNvSpPr txBox="1"/>
           <p:nvPr>
             <p:ph type="title"/>
@@ -10805,7 +10759,7 @@
           <a:p>
             <a:pPr/>
             <a:r>
-              <a:t>Work with strings with stringr : : </a:t>
+              <a:t>String manipulation with stringr : : </a:t>
             </a:r>
             <a:r>
               <a:rPr sz="3300">
@@ -20706,7 +20660,7 @@
         </p:nvGrpSpPr>
         <p:grpSpPr>
           <a:xfrm>
-            <a:off x="4918614" y="9096375"/>
+            <a:off x="4918614" y="9197975"/>
             <a:ext cx="870788" cy="495300"/>
             <a:chOff x="25400" y="25400"/>
             <a:chExt cx="870786" cy="495300"/>

</xml_diff>

<commit_message>
Fixes typo in stringr cheatsheet
</commit_message>
<xml_diff>
--- a/powerpoints/strings.pptx
+++ b/powerpoints/strings.pptx
@@ -815,8 +815,8 @@
         </p:nvSpPr>
         <p:spPr>
           <a:xfrm>
-            <a:off x="0" y="158750"/>
-            <a:ext cx="13964218" cy="10477500"/>
+            <a:off x="-873125" y="158750"/>
+            <a:ext cx="15708068" cy="10477500"/>
           </a:xfrm>
           <a:prstGeom prst="rect">
             <a:avLst/>
@@ -1075,7 +1075,7 @@
         <p:spPr>
           <a:xfrm>
             <a:off x="1725786" y="840878"/>
-            <a:ext cx="10504786" cy="6357443"/>
+            <a:ext cx="10504786" cy="7006839"/>
           </a:xfrm>
           <a:prstGeom prst="rect">
             <a:avLst/>
@@ -1350,13 +1350,13 @@
           <p:cNvPr id="38" name="Image"/>
           <p:cNvSpPr/>
           <p:nvPr>
-            <p:ph type="pic" sz="half" idx="13"/>
+            <p:ph type="pic" idx="13"/>
           </p:nvPr>
         </p:nvSpPr>
         <p:spPr>
           <a:xfrm>
-            <a:off x="7216923" y="840878"/>
-            <a:ext cx="5729884" cy="8840392"/>
+            <a:off x="2919511" y="840878"/>
+            <a:ext cx="13274230" cy="8849488"/>
           </a:xfrm>
           <a:prstGeom prst="rect">
             <a:avLst/>
@@ -1752,13 +1752,13 @@
           <p:cNvPr id="65" name="Image"/>
           <p:cNvSpPr/>
           <p:nvPr>
-            <p:ph type="pic" sz="half" idx="13"/>
+            <p:ph type="pic" idx="13"/>
           </p:nvPr>
         </p:nvSpPr>
         <p:spPr>
           <a:xfrm>
-            <a:off x="7216923" y="2955478"/>
-            <a:ext cx="5729884" cy="6753077"/>
+            <a:off x="4870400" y="2955478"/>
+            <a:ext cx="10129615" cy="6753077"/>
           </a:xfrm>
           <a:prstGeom prst="rect">
             <a:avLst/>
@@ -2019,13 +2019,13 @@
           <p:cNvPr id="83" name="Image"/>
           <p:cNvSpPr/>
           <p:nvPr>
-            <p:ph type="pic" sz="half" idx="13"/>
+            <p:ph type="pic" idx="13"/>
           </p:nvPr>
         </p:nvSpPr>
         <p:spPr>
           <a:xfrm>
-            <a:off x="1023193" y="1113730"/>
-            <a:ext cx="5729884" cy="8567540"/>
+            <a:off x="-2551163" y="1113730"/>
+            <a:ext cx="12864953" cy="8576636"/>
           </a:xfrm>
           <a:prstGeom prst="rect">
             <a:avLst/>
@@ -2051,8 +2051,8 @@
         </p:nvSpPr>
         <p:spPr>
           <a:xfrm>
-            <a:off x="7216923" y="5629423"/>
-            <a:ext cx="5729884" cy="4051847"/>
+            <a:off x="7175996" y="5558791"/>
+            <a:ext cx="6507511" cy="4340601"/>
           </a:xfrm>
           <a:prstGeom prst="rect">
             <a:avLst/>
@@ -2078,8 +2078,8 @@
         </p:nvSpPr>
         <p:spPr>
           <a:xfrm>
-            <a:off x="7223603" y="1113730"/>
-            <a:ext cx="5729884" cy="4051847"/>
+            <a:off x="6985000" y="1111310"/>
+            <a:ext cx="6302872" cy="4201915"/>
           </a:xfrm>
           <a:prstGeom prst="rect">
             <a:avLst/>
@@ -2333,9 +2333,6 @@
         <a:buNone/>
         <a:tabLst/>
         <a:defRPr b="0" baseline="0" cap="none" i="0" spc="0" strike="noStrike" sz="4800" u="none">
-          <a:ln>
-            <a:noFill/>
-          </a:ln>
           <a:solidFill>
             <a:srgbClr val="585858"/>
           </a:solidFill>
@@ -2362,9 +2359,6 @@
         <a:buNone/>
         <a:tabLst/>
         <a:defRPr b="0" baseline="0" cap="none" i="0" spc="0" strike="noStrike" sz="4800" u="none">
-          <a:ln>
-            <a:noFill/>
-          </a:ln>
           <a:solidFill>
             <a:srgbClr val="585858"/>
           </a:solidFill>
@@ -2391,9 +2385,6 @@
         <a:buNone/>
         <a:tabLst/>
         <a:defRPr b="0" baseline="0" cap="none" i="0" spc="0" strike="noStrike" sz="4800" u="none">
-          <a:ln>
-            <a:noFill/>
-          </a:ln>
           <a:solidFill>
             <a:srgbClr val="585858"/>
           </a:solidFill>
@@ -2420,9 +2411,6 @@
         <a:buNone/>
         <a:tabLst/>
         <a:defRPr b="0" baseline="0" cap="none" i="0" spc="0" strike="noStrike" sz="4800" u="none">
-          <a:ln>
-            <a:noFill/>
-          </a:ln>
           <a:solidFill>
             <a:srgbClr val="585858"/>
           </a:solidFill>
@@ -2449,9 +2437,6 @@
         <a:buNone/>
         <a:tabLst/>
         <a:defRPr b="0" baseline="0" cap="none" i="0" spc="0" strike="noStrike" sz="4800" u="none">
-          <a:ln>
-            <a:noFill/>
-          </a:ln>
           <a:solidFill>
             <a:srgbClr val="585858"/>
           </a:solidFill>
@@ -2478,9 +2463,6 @@
         <a:buNone/>
         <a:tabLst/>
         <a:defRPr b="0" baseline="0" cap="none" i="0" spc="0" strike="noStrike" sz="4800" u="none">
-          <a:ln>
-            <a:noFill/>
-          </a:ln>
           <a:solidFill>
             <a:srgbClr val="585858"/>
           </a:solidFill>
@@ -2507,9 +2489,6 @@
         <a:buNone/>
         <a:tabLst/>
         <a:defRPr b="0" baseline="0" cap="none" i="0" spc="0" strike="noStrike" sz="4800" u="none">
-          <a:ln>
-            <a:noFill/>
-          </a:ln>
           <a:solidFill>
             <a:srgbClr val="585858"/>
           </a:solidFill>
@@ -2536,9 +2515,6 @@
         <a:buNone/>
         <a:tabLst/>
         <a:defRPr b="0" baseline="0" cap="none" i="0" spc="0" strike="noStrike" sz="4800" u="none">
-          <a:ln>
-            <a:noFill/>
-          </a:ln>
           <a:solidFill>
             <a:srgbClr val="585858"/>
           </a:solidFill>
@@ -2565,9 +2541,6 @@
         <a:buNone/>
         <a:tabLst/>
         <a:defRPr b="0" baseline="0" cap="none" i="0" spc="0" strike="noStrike" sz="4800" u="none">
-          <a:ln>
-            <a:noFill/>
-          </a:ln>
           <a:solidFill>
             <a:srgbClr val="585858"/>
           </a:solidFill>
@@ -2596,9 +2569,6 @@
         <a:buChar char="•"/>
         <a:tabLst/>
         <a:defRPr b="0" baseline="0" cap="none" i="0" spc="0" strike="noStrike" sz="1200" u="none">
-          <a:ln>
-            <a:noFill/>
-          </a:ln>
           <a:solidFill>
             <a:srgbClr val="000000"/>
           </a:solidFill>
@@ -2625,9 +2595,6 @@
         <a:buChar char="•"/>
         <a:tabLst/>
         <a:defRPr b="0" baseline="0" cap="none" i="0" spc="0" strike="noStrike" sz="1200" u="none">
-          <a:ln>
-            <a:noFill/>
-          </a:ln>
           <a:solidFill>
             <a:srgbClr val="000000"/>
           </a:solidFill>
@@ -2654,9 +2621,6 @@
         <a:buChar char="•"/>
         <a:tabLst/>
         <a:defRPr b="0" baseline="0" cap="none" i="0" spc="0" strike="noStrike" sz="1200" u="none">
-          <a:ln>
-            <a:noFill/>
-          </a:ln>
           <a:solidFill>
             <a:srgbClr val="000000"/>
           </a:solidFill>
@@ -2683,9 +2647,6 @@
         <a:buChar char="•"/>
         <a:tabLst/>
         <a:defRPr b="0" baseline="0" cap="none" i="0" spc="0" strike="noStrike" sz="1200" u="none">
-          <a:ln>
-            <a:noFill/>
-          </a:ln>
           <a:solidFill>
             <a:srgbClr val="000000"/>
           </a:solidFill>
@@ -2712,9 +2673,6 @@
         <a:buChar char="•"/>
         <a:tabLst/>
         <a:defRPr b="0" baseline="0" cap="none" i="0" spc="0" strike="noStrike" sz="1200" u="none">
-          <a:ln>
-            <a:noFill/>
-          </a:ln>
           <a:solidFill>
             <a:srgbClr val="000000"/>
           </a:solidFill>
@@ -2741,9 +2699,6 @@
         <a:buChar char="•"/>
         <a:tabLst/>
         <a:defRPr b="0" baseline="0" cap="none" i="0" spc="0" strike="noStrike" sz="1200" u="none">
-          <a:ln>
-            <a:noFill/>
-          </a:ln>
           <a:solidFill>
             <a:srgbClr val="000000"/>
           </a:solidFill>
@@ -2770,9 +2725,6 @@
         <a:buChar char="•"/>
         <a:tabLst/>
         <a:defRPr b="0" baseline="0" cap="none" i="0" spc="0" strike="noStrike" sz="1200" u="none">
-          <a:ln>
-            <a:noFill/>
-          </a:ln>
           <a:solidFill>
             <a:srgbClr val="000000"/>
           </a:solidFill>
@@ -2799,9 +2751,6 @@
         <a:buChar char="•"/>
         <a:tabLst/>
         <a:defRPr b="0" baseline="0" cap="none" i="0" spc="0" strike="noStrike" sz="1200" u="none">
-          <a:ln>
-            <a:noFill/>
-          </a:ln>
           <a:solidFill>
             <a:srgbClr val="000000"/>
           </a:solidFill>
@@ -2828,9 +2777,6 @@
         <a:buChar char="•"/>
         <a:tabLst/>
         <a:defRPr b="0" baseline="0" cap="none" i="0" spc="0" strike="noStrike" sz="1200" u="none">
-          <a:ln>
-            <a:noFill/>
-          </a:ln>
           <a:solidFill>
             <a:srgbClr val="000000"/>
           </a:solidFill>
@@ -2859,9 +2805,6 @@
         <a:buNone/>
         <a:tabLst/>
         <a:defRPr b="0" baseline="0" cap="none" i="0" spc="0" strike="noStrike" sz="1800" u="none">
-          <a:ln>
-            <a:noFill/>
-          </a:ln>
           <a:solidFill>
             <a:schemeClr val="tx1"/>
           </a:solidFill>
@@ -2888,9 +2831,6 @@
         <a:buNone/>
         <a:tabLst/>
         <a:defRPr b="0" baseline="0" cap="none" i="0" spc="0" strike="noStrike" sz="1800" u="none">
-          <a:ln>
-            <a:noFill/>
-          </a:ln>
           <a:solidFill>
             <a:schemeClr val="tx1"/>
           </a:solidFill>
@@ -2917,9 +2857,6 @@
         <a:buNone/>
         <a:tabLst/>
         <a:defRPr b="0" baseline="0" cap="none" i="0" spc="0" strike="noStrike" sz="1800" u="none">
-          <a:ln>
-            <a:noFill/>
-          </a:ln>
           <a:solidFill>
             <a:schemeClr val="tx1"/>
           </a:solidFill>
@@ -2946,9 +2883,6 @@
         <a:buNone/>
         <a:tabLst/>
         <a:defRPr b="0" baseline="0" cap="none" i="0" spc="0" strike="noStrike" sz="1800" u="none">
-          <a:ln>
-            <a:noFill/>
-          </a:ln>
           <a:solidFill>
             <a:schemeClr val="tx1"/>
           </a:solidFill>
@@ -2975,9 +2909,6 @@
         <a:buNone/>
         <a:tabLst/>
         <a:defRPr b="0" baseline="0" cap="none" i="0" spc="0" strike="noStrike" sz="1800" u="none">
-          <a:ln>
-            <a:noFill/>
-          </a:ln>
           <a:solidFill>
             <a:schemeClr val="tx1"/>
           </a:solidFill>
@@ -3004,9 +2935,6 @@
         <a:buNone/>
         <a:tabLst/>
         <a:defRPr b="0" baseline="0" cap="none" i="0" spc="0" strike="noStrike" sz="1800" u="none">
-          <a:ln>
-            <a:noFill/>
-          </a:ln>
           <a:solidFill>
             <a:schemeClr val="tx1"/>
           </a:solidFill>
@@ -3033,9 +2961,6 @@
         <a:buNone/>
         <a:tabLst/>
         <a:defRPr b="0" baseline="0" cap="none" i="0" spc="0" strike="noStrike" sz="1800" u="none">
-          <a:ln>
-            <a:noFill/>
-          </a:ln>
           <a:solidFill>
             <a:schemeClr val="tx1"/>
           </a:solidFill>
@@ -3062,9 +2987,6 @@
         <a:buNone/>
         <a:tabLst/>
         <a:defRPr b="0" baseline="0" cap="none" i="0" spc="0" strike="noStrike" sz="1800" u="none">
-          <a:ln>
-            <a:noFill/>
-          </a:ln>
           <a:solidFill>
             <a:schemeClr val="tx1"/>
           </a:solidFill>
@@ -3091,9 +3013,6 @@
         <a:buNone/>
         <a:tabLst/>
         <a:defRPr b="0" baseline="0" cap="none" i="0" spc="0" strike="noStrike" sz="1800" u="none">
-          <a:ln>
-            <a:noFill/>
-          </a:ln>
           <a:solidFill>
             <a:schemeClr val="tx1"/>
           </a:solidFill>
@@ -4619,10 +4538,28 @@
             </a:r>
             <a:r>
               <a:rPr b="1"/>
-              <a:t>collapse = NULL</a:t>
+              <a:t>collapse = ""</a:t>
             </a:r>
             <a:r>
-              <a:t>) Collapse a vector of strings into a single string. </a:t>
+              <a:t>) Collapse </a:t>
+            </a:r>
+          </a:p>
+          <a:p>
+            <a:pPr>
+              <a:lnSpc>
+                <a:spcPct val="80000"/>
+              </a:lnSpc>
+              <a:spcBef>
+                <a:spcPts val="0"/>
+              </a:spcBef>
+              <a:defRPr b="0">
+                <a:solidFill>
+                  <a:srgbClr val="000000"/>
+                </a:solidFill>
+              </a:defRPr>
+            </a:pPr>
+            <a:r>
+              <a:t>a vector of strings into a single string. </a:t>
             </a:r>
             <a:r>
               <a:rPr i="1"/>
@@ -7209,26 +7146,60 @@
         </p:nvGrpSpPr>
         <p:grpSpPr>
           <a:xfrm>
-            <a:off x="454489" y="8348989"/>
-            <a:ext cx="552792" cy="441677"/>
-            <a:chOff x="0" y="0"/>
-            <a:chExt cx="552790" cy="441676"/>
+            <a:off x="454489" y="8467059"/>
+            <a:ext cx="552792" cy="205537"/>
+            <a:chOff x="0" y="118070"/>
+            <a:chExt cx="552790" cy="205535"/>
           </a:xfrm>
         </p:grpSpPr>
         <p:sp>
           <p:nvSpPr>
             <p:cNvPr id="204" name="a string"/>
-            <p:cNvSpPr txBox="1"/>
+            <p:cNvSpPr/>
             <p:nvPr/>
           </p:nvSpPr>
           <p:spPr>
             <a:xfrm>
-              <a:off x="63151" y="0"/>
-              <a:ext cx="426489" cy="236141"/>
+              <a:off x="63151" y="118070"/>
+              <a:ext cx="426489" cy="1"/>
             </a:xfrm>
-            <a:prstGeom prst="rect">
+            <a:custGeom>
               <a:avLst/>
-            </a:prstGeom>
+              <a:gdLst/>
+              <a:ahLst/>
+              <a:cxnLst>
+                <a:cxn ang="0">
+                  <a:pos x="wd2" y="hd2"/>
+                </a:cxn>
+                <a:cxn ang="5400000">
+                  <a:pos x="wd2" y="hd2"/>
+                </a:cxn>
+                <a:cxn ang="10800000">
+                  <a:pos x="wd2" y="hd2"/>
+                </a:cxn>
+                <a:cxn ang="16200000">
+                  <a:pos x="wd2" y="hd2"/>
+                </a:cxn>
+              </a:cxnLst>
+              <a:rect l="0" t="0" r="r" b="b"/>
+              <a:pathLst>
+                <a:path w="21600" h="0" fill="norm" stroke="1" extrusionOk="0">
+                  <a:moveTo>
+                    <a:pt x="0" y="0"/>
+                  </a:moveTo>
+                  <a:lnTo>
+                    <a:pt x="21600" y="0"/>
+                  </a:lnTo>
+                  <a:lnTo>
+                    <a:pt x="21600" y="0"/>
+                  </a:lnTo>
+                  <a:lnTo>
+                    <a:pt x="0" y="0"/>
+                  </a:lnTo>
+                  <a:close/>
+                </a:path>
+              </a:pathLst>
+            </a:custGeom>
             <a:noFill/>
             <a:ln w="12700" cap="flat">
               <a:noFill/>
@@ -7265,17 +7236,51 @@
         <p:sp>
           <p:nvSpPr>
             <p:cNvPr id="205" name="A STRING"/>
-            <p:cNvSpPr txBox="1"/>
+            <p:cNvSpPr/>
             <p:nvPr/>
           </p:nvSpPr>
           <p:spPr>
             <a:xfrm>
-              <a:off x="0" y="205535"/>
-              <a:ext cx="552791" cy="236142"/>
+              <a:off x="0" y="323605"/>
+              <a:ext cx="552791" cy="1"/>
             </a:xfrm>
-            <a:prstGeom prst="rect">
+            <a:custGeom>
               <a:avLst/>
-            </a:prstGeom>
+              <a:gdLst/>
+              <a:ahLst/>
+              <a:cxnLst>
+                <a:cxn ang="0">
+                  <a:pos x="wd2" y="hd2"/>
+                </a:cxn>
+                <a:cxn ang="5400000">
+                  <a:pos x="wd2" y="hd2"/>
+                </a:cxn>
+                <a:cxn ang="10800000">
+                  <a:pos x="wd2" y="hd2"/>
+                </a:cxn>
+                <a:cxn ang="16200000">
+                  <a:pos x="wd2" y="hd2"/>
+                </a:cxn>
+              </a:cxnLst>
+              <a:rect l="0" t="0" r="r" b="b"/>
+              <a:pathLst>
+                <a:path w="21600" h="0" fill="norm" stroke="1" extrusionOk="0">
+                  <a:moveTo>
+                    <a:pt x="0" y="0"/>
+                  </a:moveTo>
+                  <a:lnTo>
+                    <a:pt x="21600" y="0"/>
+                  </a:lnTo>
+                  <a:lnTo>
+                    <a:pt x="21600" y="0"/>
+                  </a:lnTo>
+                  <a:lnTo>
+                    <a:pt x="0" y="0"/>
+                  </a:lnTo>
+                  <a:close/>
+                </a:path>
+              </a:pathLst>
+            </a:custGeom>
             <a:noFill/>
             <a:ln w="12700" cap="flat">
               <a:noFill/>
@@ -7376,26 +7381,60 @@
         </p:nvGrpSpPr>
         <p:grpSpPr>
           <a:xfrm>
-            <a:off x="454489" y="7752089"/>
-            <a:ext cx="552792" cy="428977"/>
-            <a:chOff x="20729" y="0"/>
-            <a:chExt cx="552790" cy="428976"/>
+            <a:off x="454489" y="7870159"/>
+            <a:ext cx="552792" cy="192837"/>
+            <a:chOff x="0" y="118070"/>
+            <a:chExt cx="552790" cy="192835"/>
           </a:xfrm>
         </p:grpSpPr>
         <p:sp>
           <p:nvSpPr>
             <p:cNvPr id="208" name="A STRING"/>
-            <p:cNvSpPr txBox="1"/>
+            <p:cNvSpPr/>
             <p:nvPr/>
           </p:nvSpPr>
           <p:spPr>
             <a:xfrm>
-              <a:off x="31575" y="-1"/>
-              <a:ext cx="531100" cy="236142"/>
+              <a:off x="10845" y="118070"/>
+              <a:ext cx="531100" cy="1"/>
             </a:xfrm>
-            <a:prstGeom prst="rect">
+            <a:custGeom>
               <a:avLst/>
-            </a:prstGeom>
+              <a:gdLst/>
+              <a:ahLst/>
+              <a:cxnLst>
+                <a:cxn ang="0">
+                  <a:pos x="wd2" y="hd2"/>
+                </a:cxn>
+                <a:cxn ang="5400000">
+                  <a:pos x="wd2" y="hd2"/>
+                </a:cxn>
+                <a:cxn ang="10800000">
+                  <a:pos x="wd2" y="hd2"/>
+                </a:cxn>
+                <a:cxn ang="16200000">
+                  <a:pos x="wd2" y="hd2"/>
+                </a:cxn>
+              </a:cxnLst>
+              <a:rect l="0" t="0" r="r" b="b"/>
+              <a:pathLst>
+                <a:path w="21600" h="0" fill="norm" stroke="1" extrusionOk="0">
+                  <a:moveTo>
+                    <a:pt x="0" y="0"/>
+                  </a:moveTo>
+                  <a:lnTo>
+                    <a:pt x="21600" y="0"/>
+                  </a:lnTo>
+                  <a:lnTo>
+                    <a:pt x="21600" y="0"/>
+                  </a:lnTo>
+                  <a:lnTo>
+                    <a:pt x="0" y="0"/>
+                  </a:lnTo>
+                  <a:close/>
+                </a:path>
+              </a:pathLst>
+            </a:custGeom>
             <a:noFill/>
             <a:ln w="12700" cap="flat">
               <a:noFill/>
@@ -7432,17 +7471,51 @@
         <p:sp>
           <p:nvSpPr>
             <p:cNvPr id="209" name="a string"/>
-            <p:cNvSpPr txBox="1"/>
+            <p:cNvSpPr/>
             <p:nvPr/>
           </p:nvSpPr>
           <p:spPr>
             <a:xfrm>
-              <a:off x="20729" y="192835"/>
-              <a:ext cx="552792" cy="236142"/>
+              <a:off x="0" y="310905"/>
+              <a:ext cx="552791" cy="1"/>
             </a:xfrm>
-            <a:prstGeom prst="rect">
+            <a:custGeom>
               <a:avLst/>
-            </a:prstGeom>
+              <a:gdLst/>
+              <a:ahLst/>
+              <a:cxnLst>
+                <a:cxn ang="0">
+                  <a:pos x="wd2" y="hd2"/>
+                </a:cxn>
+                <a:cxn ang="5400000">
+                  <a:pos x="wd2" y="hd2"/>
+                </a:cxn>
+                <a:cxn ang="10800000">
+                  <a:pos x="wd2" y="hd2"/>
+                </a:cxn>
+                <a:cxn ang="16200000">
+                  <a:pos x="wd2" y="hd2"/>
+                </a:cxn>
+              </a:cxnLst>
+              <a:rect l="0" t="0" r="r" b="b"/>
+              <a:pathLst>
+                <a:path w="21600" h="0" fill="norm" stroke="1" extrusionOk="0">
+                  <a:moveTo>
+                    <a:pt x="0" y="0"/>
+                  </a:moveTo>
+                  <a:lnTo>
+                    <a:pt x="21600" y="0"/>
+                  </a:lnTo>
+                  <a:lnTo>
+                    <a:pt x="21600" y="0"/>
+                  </a:lnTo>
+                  <a:lnTo>
+                    <a:pt x="0" y="0"/>
+                  </a:lnTo>
+                  <a:close/>
+                </a:path>
+              </a:pathLst>
+            </a:custGeom>
             <a:noFill/>
             <a:ln w="12700" cap="flat">
               <a:noFill/>
@@ -7484,7 +7557,7 @@
           </p:nvSpPr>
           <p:spPr>
             <a:xfrm>
-              <a:off x="297125" y="173833"/>
+              <a:off x="276395" y="173833"/>
               <a:ext cx="1" cy="101505"/>
             </a:xfrm>
             <a:prstGeom prst="line">
@@ -7965,10 +8038,10 @@
         </p:nvGrpSpPr>
         <p:grpSpPr>
           <a:xfrm>
-            <a:off x="428737" y="7202818"/>
-            <a:ext cx="217084" cy="496430"/>
-            <a:chOff x="24216" y="24271"/>
-            <a:chExt cx="217083" cy="496428"/>
+            <a:off x="404521" y="7178547"/>
+            <a:ext cx="279401" cy="533401"/>
+            <a:chOff x="0" y="0"/>
+            <a:chExt cx="279400" cy="533400"/>
           </a:xfrm>
         </p:grpSpPr>
         <p:sp>
@@ -8251,8 +8324,8 @@
             <p:nvPr/>
           </p:nvGraphicFramePr>
           <p:xfrm>
-            <a:off x="25400" y="25400"/>
-            <a:ext cx="215900" cy="495300"/>
+            <a:off x="0" y="0"/>
+            <a:ext cx="279400" cy="533400"/>
           </p:xfrm>
           <a:graphic xmlns:a="http://schemas.openxmlformats.org/drawingml/2006/main">
             <a:graphicData uri="http://schemas.openxmlformats.org/drawingml/2006/table">
@@ -10244,26 +10317,60 @@
         </p:nvGrpSpPr>
         <p:grpSpPr>
           <a:xfrm>
-            <a:off x="449445" y="8931805"/>
-            <a:ext cx="552792" cy="428977"/>
-            <a:chOff x="0" y="0"/>
-            <a:chExt cx="552790" cy="428976"/>
+            <a:off x="449445" y="9049875"/>
+            <a:ext cx="552792" cy="192837"/>
+            <a:chOff x="0" y="118070"/>
+            <a:chExt cx="552790" cy="192835"/>
           </a:xfrm>
         </p:grpSpPr>
         <p:sp>
           <p:nvSpPr>
             <p:cNvPr id="258" name="a string"/>
-            <p:cNvSpPr txBox="1"/>
+            <p:cNvSpPr/>
             <p:nvPr/>
           </p:nvSpPr>
           <p:spPr>
             <a:xfrm>
-              <a:off x="63151" y="0"/>
-              <a:ext cx="426489" cy="236141"/>
+              <a:off x="63151" y="118070"/>
+              <a:ext cx="426489" cy="1"/>
             </a:xfrm>
-            <a:prstGeom prst="rect">
+            <a:custGeom>
               <a:avLst/>
-            </a:prstGeom>
+              <a:gdLst/>
+              <a:ahLst/>
+              <a:cxnLst>
+                <a:cxn ang="0">
+                  <a:pos x="wd2" y="hd2"/>
+                </a:cxn>
+                <a:cxn ang="5400000">
+                  <a:pos x="wd2" y="hd2"/>
+                </a:cxn>
+                <a:cxn ang="10800000">
+                  <a:pos x="wd2" y="hd2"/>
+                </a:cxn>
+                <a:cxn ang="16200000">
+                  <a:pos x="wd2" y="hd2"/>
+                </a:cxn>
+              </a:cxnLst>
+              <a:rect l="0" t="0" r="r" b="b"/>
+              <a:pathLst>
+                <a:path w="21600" h="0" fill="norm" stroke="1" extrusionOk="0">
+                  <a:moveTo>
+                    <a:pt x="0" y="0"/>
+                  </a:moveTo>
+                  <a:lnTo>
+                    <a:pt x="21600" y="0"/>
+                  </a:lnTo>
+                  <a:lnTo>
+                    <a:pt x="21600" y="0"/>
+                  </a:lnTo>
+                  <a:lnTo>
+                    <a:pt x="0" y="0"/>
+                  </a:lnTo>
+                  <a:close/>
+                </a:path>
+              </a:pathLst>
+            </a:custGeom>
             <a:noFill/>
             <a:ln w="12700" cap="flat">
               <a:noFill/>
@@ -10300,17 +10407,51 @@
         <p:sp>
           <p:nvSpPr>
             <p:cNvPr id="259" name="A String"/>
-            <p:cNvSpPr txBox="1"/>
+            <p:cNvSpPr/>
             <p:nvPr/>
           </p:nvSpPr>
           <p:spPr>
             <a:xfrm>
-              <a:off x="0" y="192835"/>
-              <a:ext cx="552791" cy="236142"/>
+              <a:off x="0" y="310905"/>
+              <a:ext cx="552791" cy="1"/>
             </a:xfrm>
-            <a:prstGeom prst="rect">
+            <a:custGeom>
               <a:avLst/>
-            </a:prstGeom>
+              <a:gdLst/>
+              <a:ahLst/>
+              <a:cxnLst>
+                <a:cxn ang="0">
+                  <a:pos x="wd2" y="hd2"/>
+                </a:cxn>
+                <a:cxn ang="5400000">
+                  <a:pos x="wd2" y="hd2"/>
+                </a:cxn>
+                <a:cxn ang="10800000">
+                  <a:pos x="wd2" y="hd2"/>
+                </a:cxn>
+                <a:cxn ang="16200000">
+                  <a:pos x="wd2" y="hd2"/>
+                </a:cxn>
+              </a:cxnLst>
+              <a:rect l="0" t="0" r="r" b="b"/>
+              <a:pathLst>
+                <a:path w="21600" h="0" fill="norm" stroke="1" extrusionOk="0">
+                  <a:moveTo>
+                    <a:pt x="0" y="0"/>
+                  </a:moveTo>
+                  <a:lnTo>
+                    <a:pt x="21600" y="0"/>
+                  </a:lnTo>
+                  <a:lnTo>
+                    <a:pt x="21600" y="0"/>
+                  </a:lnTo>
+                  <a:lnTo>
+                    <a:pt x="0" y="0"/>
+                  </a:lnTo>
+                  <a:close/>
+                </a:path>
+              </a:pathLst>
+            </a:custGeom>
             <a:noFill/>
             <a:ln w="12700" cap="flat">
               <a:noFill/>
@@ -10411,10 +10552,10 @@
         </p:nvGrpSpPr>
         <p:grpSpPr>
           <a:xfrm>
-            <a:off x="425977" y="3924525"/>
-            <a:ext cx="650940" cy="609601"/>
-            <a:chOff x="25400" y="25400"/>
-            <a:chExt cx="650938" cy="609600"/>
+            <a:off x="400577" y="3899125"/>
+            <a:ext cx="254001" cy="520701"/>
+            <a:chOff x="0" y="0"/>
+            <a:chExt cx="254000" cy="520700"/>
           </a:xfrm>
         </p:grpSpPr>
         <p:graphicFrame>
@@ -10424,8 +10565,8 @@
             <p:nvPr/>
           </p:nvGraphicFramePr>
           <p:xfrm>
-            <a:off x="25400" y="25400"/>
-            <a:ext cx="650939" cy="609600"/>
+            <a:off x="0" y="0"/>
+            <a:ext cx="254000" cy="520700"/>
           </p:xfrm>
           <a:graphic xmlns:a="http://schemas.openxmlformats.org/drawingml/2006/main">
             <a:graphicData uri="http://schemas.openxmlformats.org/drawingml/2006/table">
@@ -10700,10 +10841,10 @@
         </p:nvGrpSpPr>
         <p:grpSpPr>
           <a:xfrm>
-            <a:off x="427161" y="2656626"/>
-            <a:ext cx="650940" cy="609601"/>
-            <a:chOff x="25400" y="25400"/>
-            <a:chExt cx="650938" cy="609600"/>
+            <a:off x="401761" y="2631226"/>
+            <a:ext cx="254001" cy="520701"/>
+            <a:chOff x="0" y="0"/>
+            <a:chExt cx="254000" cy="520700"/>
           </a:xfrm>
         </p:grpSpPr>
         <p:graphicFrame>
@@ -10713,8 +10854,8 @@
             <p:nvPr/>
           </p:nvGraphicFramePr>
           <p:xfrm>
-            <a:off x="25400" y="25400"/>
-            <a:ext cx="650939" cy="609600"/>
+            <a:off x="0" y="0"/>
+            <a:ext cx="254000" cy="520700"/>
           </p:xfrm>
           <a:graphic xmlns:a="http://schemas.openxmlformats.org/drawingml/2006/main">
             <a:graphicData uri="http://schemas.openxmlformats.org/drawingml/2006/table">
@@ -12066,10 +12207,10 @@
         </p:nvGrpSpPr>
         <p:grpSpPr>
           <a:xfrm>
-            <a:off x="427161" y="2035199"/>
-            <a:ext cx="650940" cy="609601"/>
-            <a:chOff x="25400" y="25400"/>
-            <a:chExt cx="650938" cy="609600"/>
+            <a:off x="401761" y="2009799"/>
+            <a:ext cx="254001" cy="520701"/>
+            <a:chOff x="0" y="0"/>
+            <a:chExt cx="254000" cy="520700"/>
           </a:xfrm>
         </p:grpSpPr>
         <p:graphicFrame>
@@ -12079,8 +12220,8 @@
             <p:nvPr/>
           </p:nvGraphicFramePr>
           <p:xfrm>
-            <a:off x="25400" y="25400"/>
-            <a:ext cx="650939" cy="609600"/>
+            <a:off x="0" y="0"/>
+            <a:ext cx="254000" cy="520700"/>
           </p:xfrm>
           <a:graphic xmlns:a="http://schemas.openxmlformats.org/drawingml/2006/main">
             <a:graphicData uri="http://schemas.openxmlformats.org/drawingml/2006/table">
@@ -19049,10 +19190,10 @@
         </p:nvGrpSpPr>
         <p:grpSpPr>
           <a:xfrm>
-            <a:off x="4909757" y="2649399"/>
-            <a:ext cx="650940" cy="609601"/>
-            <a:chOff x="25400" y="25400"/>
-            <a:chExt cx="650938" cy="609600"/>
+            <a:off x="4884357" y="2623999"/>
+            <a:ext cx="254001" cy="520701"/>
+            <a:chOff x="0" y="0"/>
+            <a:chExt cx="254000" cy="520700"/>
           </a:xfrm>
         </p:grpSpPr>
         <p:graphicFrame>
@@ -19062,8 +19203,8 @@
             <p:nvPr/>
           </p:nvGraphicFramePr>
           <p:xfrm>
-            <a:off x="25400" y="25400"/>
-            <a:ext cx="650939" cy="609600"/>
+            <a:off x="0" y="0"/>
+            <a:ext cx="254000" cy="520700"/>
           </p:xfrm>
           <a:graphic xmlns:a="http://schemas.openxmlformats.org/drawingml/2006/main">
             <a:graphicData uri="http://schemas.openxmlformats.org/drawingml/2006/table">

</xml_diff>

<commit_message>
changed str_split_n to str_split_i within .pptx
</commit_message>
<xml_diff>
--- a/powerpoints/strings.pptx
+++ b/powerpoints/strings.pptx
@@ -2333,7 +2333,7 @@
           </a:ln>
           <a:extLst>
             <a:ext uri="{C572A759-6A51-4108-AA02-DFA0A04FC94B}">
-              <ma14:wrappingTextBoxFlag xmlns="" xmlns:m="http://schemas.openxmlformats.org/officeDocument/2006/math" xmlns:a14="http://schemas.microsoft.com/office/drawing/2010/main" xmlns:ma14="http://schemas.microsoft.com/office/mac/drawingml/2011/main" val="1"/>
+              <ma14:wrappingTextBoxFlag xmlns:ma14="http://schemas.microsoft.com/office/mac/drawingml/2011/main" xmlns:a14="http://schemas.microsoft.com/office/drawing/2010/main" xmlns:m="http://schemas.openxmlformats.org/officeDocument/2006/math" xmlns="" val="1"/>
             </a:ext>
           </a:extLst>
         </p:spPr>
@@ -2372,7 +2372,7 @@
           </a:ln>
           <a:extLst>
             <a:ext uri="{C572A759-6A51-4108-AA02-DFA0A04FC94B}">
-              <ma14:wrappingTextBoxFlag xmlns="" xmlns:m="http://schemas.openxmlformats.org/officeDocument/2006/math" xmlns:a14="http://schemas.microsoft.com/office/drawing/2010/main" xmlns:ma14="http://schemas.microsoft.com/office/mac/drawingml/2011/main" val="1"/>
+              <ma14:wrappingTextBoxFlag xmlns:ma14="http://schemas.microsoft.com/office/mac/drawingml/2011/main" xmlns:a14="http://schemas.microsoft.com/office/drawing/2010/main" xmlns:m="http://schemas.openxmlformats.org/officeDocument/2006/math" xmlns="" val="1"/>
             </a:ext>
           </a:extLst>
         </p:spPr>
@@ -4377,7 +4377,7 @@
           </a:ln>
           <a:extLst>
             <a:ext uri="{C572A759-6A51-4108-AA02-DFA0A04FC94B}">
-              <ma14:wrappingTextBoxFlag xmlns="" xmlns:m="http://schemas.openxmlformats.org/officeDocument/2006/math" xmlns:a14="http://schemas.microsoft.com/office/drawing/2010/main" xmlns:ma14="http://schemas.microsoft.com/office/mac/drawingml/2011/main" val="1"/>
+              <ma14:wrappingTextBoxFlag xmlns:ma14="http://schemas.microsoft.com/office/mac/drawingml/2011/main" xmlns:a14="http://schemas.microsoft.com/office/drawing/2010/main" xmlns:m="http://schemas.openxmlformats.org/officeDocument/2006/math" xmlns="" val="1"/>
             </a:ext>
           </a:extLst>
         </p:spPr>
@@ -4497,7 +4497,7 @@
           </a:ln>
           <a:extLst>
             <a:ext uri="{C572A759-6A51-4108-AA02-DFA0A04FC94B}">
-              <ma14:wrappingTextBoxFlag xmlns="" xmlns:m="http://schemas.openxmlformats.org/officeDocument/2006/math" xmlns:a14="http://schemas.microsoft.com/office/drawing/2010/main" xmlns:ma14="http://schemas.microsoft.com/office/mac/drawingml/2011/main" val="1"/>
+              <ma14:wrappingTextBoxFlag xmlns:ma14="http://schemas.microsoft.com/office/mac/drawingml/2011/main" xmlns:a14="http://schemas.microsoft.com/office/drawing/2010/main" xmlns:m="http://schemas.openxmlformats.org/officeDocument/2006/math" xmlns="" val="1"/>
             </a:ext>
           </a:extLst>
         </p:spPr>
@@ -4545,7 +4545,7 @@
           </a:ln>
           <a:extLst>
             <a:ext uri="{C572A759-6A51-4108-AA02-DFA0A04FC94B}">
-              <ma14:wrappingTextBoxFlag xmlns="" xmlns:m="http://schemas.openxmlformats.org/officeDocument/2006/math" xmlns:a14="http://schemas.microsoft.com/office/drawing/2010/main" xmlns:ma14="http://schemas.microsoft.com/office/mac/drawingml/2011/main" val="1"/>
+              <ma14:wrappingTextBoxFlag xmlns:ma14="http://schemas.microsoft.com/office/mac/drawingml/2011/main" xmlns:a14="http://schemas.microsoft.com/office/drawing/2010/main" xmlns:m="http://schemas.openxmlformats.org/officeDocument/2006/math" xmlns="" val="1"/>
             </a:ext>
           </a:extLst>
         </p:spPr>
@@ -4573,22 +4573,46 @@
               </a:defRPr>
             </a:pPr>
             <a:r>
-              <a:t>str_c(</a:t>
+              <a:rPr dirty="0" err="1"/>
+              <a:t>str_c</a:t>
             </a:r>
             <a:r>
-              <a:rPr>
+              <a:rPr dirty="0"/>
+              <a:t>(</a:t>
+            </a:r>
+            <a:r>
+              <a:rPr dirty="0">
                 <a:latin typeface="+mn-lt"/>
                 <a:ea typeface="+mn-ea"/>
                 <a:cs typeface="+mn-cs"/>
                 <a:sym typeface="Source Sans Pro Regular"/>
               </a:rPr>
-              <a:t>..., sep = "", collapse = NULL</a:t>
+              <a:t>..., </a:t>
             </a:r>
             <a:r>
+              <a:rPr dirty="0" err="1">
+                <a:latin typeface="+mn-lt"/>
+                <a:ea typeface="+mn-ea"/>
+                <a:cs typeface="+mn-cs"/>
+                <a:sym typeface="Source Sans Pro Regular"/>
+              </a:rPr>
+              <a:t>sep</a:t>
+            </a:r>
+            <a:r>
+              <a:rPr dirty="0">
+                <a:latin typeface="+mn-lt"/>
+                <a:ea typeface="+mn-ea"/>
+                <a:cs typeface="+mn-cs"/>
+                <a:sym typeface="Source Sans Pro Regular"/>
+              </a:rPr>
+              <a:t> = "", collapse = NULL</a:t>
+            </a:r>
+            <a:r>
+              <a:rPr dirty="0"/>
               <a:t>) </a:t>
             </a:r>
             <a:r>
-              <a:rPr>
+              <a:rPr dirty="0">
                 <a:latin typeface="+mn-lt"/>
                 <a:ea typeface="+mn-ea"/>
                 <a:cs typeface="+mn-cs"/>
@@ -4597,15 +4621,24 @@
               <a:t>Join multiple strings into a single string. </a:t>
             </a:r>
             <a:r>
-              <a:rPr>
+              <a:rPr dirty="0" err="1">
                 <a:latin typeface="Source Sans Pro ExtraLight"/>
                 <a:ea typeface="Source Sans Pro ExtraLight"/>
                 <a:cs typeface="Source Sans Pro ExtraLight"/>
                 <a:sym typeface="Source Sans Pro ExtraLight"/>
               </a:rPr>
-              <a:t>str_c(letters, LETTERS)</a:t>
+              <a:t>str_c</a:t>
             </a:r>
-            <a:endParaRPr i="1"/>
+            <a:r>
+              <a:rPr dirty="0">
+                <a:latin typeface="Source Sans Pro ExtraLight"/>
+                <a:ea typeface="Source Sans Pro ExtraLight"/>
+                <a:cs typeface="Source Sans Pro ExtraLight"/>
+                <a:sym typeface="Source Sans Pro ExtraLight"/>
+              </a:rPr>
+              <a:t>(letters, LETTERS)</a:t>
+            </a:r>
+            <a:endParaRPr i="1" dirty="0"/>
           </a:p>
           <a:p>
             <a:pPr>
@@ -4626,10 +4659,15 @@
               </a:defRPr>
             </a:pPr>
             <a:r>
-              <a:t>str_flatten(</a:t>
+              <a:rPr dirty="0" err="1"/>
+              <a:t>str_flatten</a:t>
             </a:r>
             <a:r>
-              <a:rPr>
+              <a:rPr dirty="0"/>
+              <a:t>(</a:t>
+            </a:r>
+            <a:r>
+              <a:rPr dirty="0">
                 <a:latin typeface="+mn-lt"/>
                 <a:ea typeface="+mn-ea"/>
                 <a:cs typeface="+mn-cs"/>
@@ -4638,10 +4676,11 @@
               <a:t>string, collapse = ""</a:t>
             </a:r>
             <a:r>
+              <a:rPr dirty="0"/>
               <a:t>) </a:t>
             </a:r>
             <a:r>
-              <a:rPr>
+              <a:rPr dirty="0">
                 <a:latin typeface="+mn-lt"/>
                 <a:ea typeface="+mn-ea"/>
                 <a:cs typeface="+mn-cs"/>
@@ -4650,15 +4689,24 @@
               <a:t>Combines into a single string, separated by collapse. </a:t>
             </a:r>
             <a:r>
-              <a:rPr>
+              <a:rPr dirty="0" err="1">
                 <a:latin typeface="Source Sans Pro ExtraLight"/>
                 <a:ea typeface="Source Sans Pro ExtraLight"/>
                 <a:cs typeface="Source Sans Pro ExtraLight"/>
                 <a:sym typeface="Source Sans Pro ExtraLight"/>
               </a:rPr>
-              <a:t>str_flatten(fruit, ", ")</a:t>
+              <a:t>str_flatten</a:t>
             </a:r>
-            <a:endParaRPr i="1"/>
+            <a:r>
+              <a:rPr dirty="0">
+                <a:latin typeface="Source Sans Pro ExtraLight"/>
+                <a:ea typeface="Source Sans Pro ExtraLight"/>
+                <a:cs typeface="Source Sans Pro ExtraLight"/>
+                <a:sym typeface="Source Sans Pro ExtraLight"/>
+              </a:rPr>
+              <a:t>(fruit, ", ")</a:t>
+            </a:r>
+            <a:endParaRPr i="1" dirty="0"/>
           </a:p>
           <a:p>
             <a:pPr>
@@ -4679,10 +4727,15 @@
               </a:defRPr>
             </a:pPr>
             <a:r>
-              <a:t>str_dup(</a:t>
+              <a:rPr dirty="0" err="1"/>
+              <a:t>str_dup</a:t>
             </a:r>
             <a:r>
-              <a:rPr>
+              <a:rPr dirty="0"/>
+              <a:t>(</a:t>
+            </a:r>
+            <a:r>
+              <a:rPr dirty="0">
                 <a:latin typeface="+mn-lt"/>
                 <a:ea typeface="+mn-ea"/>
                 <a:cs typeface="+mn-cs"/>
@@ -4691,22 +4744,46 @@
               <a:t>string, times</a:t>
             </a:r>
             <a:r>
+              <a:rPr dirty="0"/>
               <a:t>)</a:t>
             </a:r>
             <a:r>
-              <a:rPr>
+              <a:rPr dirty="0">
                 <a:latin typeface="+mn-lt"/>
                 <a:ea typeface="+mn-ea"/>
                 <a:cs typeface="+mn-cs"/>
                 <a:sym typeface="Source Sans Pro Regular"/>
               </a:rPr>
-              <a:t> Repeat strings times times. Also </a:t>
+              <a:t> Repeat strings times </a:t>
             </a:r>
             <a:r>
-              <a:t>str_unique()</a:t>
+              <a:rPr dirty="0" err="1">
+                <a:latin typeface="+mn-lt"/>
+                <a:ea typeface="+mn-ea"/>
+                <a:cs typeface="+mn-cs"/>
+                <a:sym typeface="Source Sans Pro Regular"/>
+              </a:rPr>
+              <a:t>times</a:t>
             </a:r>
             <a:r>
-              <a:rPr>
+              <a:rPr dirty="0">
+                <a:latin typeface="+mn-lt"/>
+                <a:ea typeface="+mn-ea"/>
+                <a:cs typeface="+mn-cs"/>
+                <a:sym typeface="Source Sans Pro Regular"/>
+              </a:rPr>
+              <a:t>. Also </a:t>
+            </a:r>
+            <a:r>
+              <a:rPr dirty="0" err="1"/>
+              <a:t>str_unique</a:t>
+            </a:r>
+            <a:r>
+              <a:rPr dirty="0"/>
+              <a:t>()</a:t>
+            </a:r>
+            <a:r>
+              <a:rPr dirty="0">
                 <a:latin typeface="+mn-lt"/>
                 <a:ea typeface="+mn-ea"/>
                 <a:cs typeface="+mn-cs"/>
@@ -4715,15 +4792,33 @@
               <a:t> to remove duplicates.</a:t>
             </a:r>
             <a:r>
-              <a:rPr>
+              <a:rPr dirty="0">
                 <a:latin typeface="Source Sans Pro ExtraLight"/>
                 <a:ea typeface="Source Sans Pro ExtraLight"/>
                 <a:cs typeface="Source Sans Pro ExtraLight"/>
                 <a:sym typeface="Source Sans Pro ExtraLight"/>
               </a:rPr>
-              <a:t> str_dup(fruit, times = 2)</a:t>
+              <a:t> </a:t>
             </a:r>
-            <a:endParaRPr i="1"/>
+            <a:r>
+              <a:rPr dirty="0" err="1">
+                <a:latin typeface="Source Sans Pro ExtraLight"/>
+                <a:ea typeface="Source Sans Pro ExtraLight"/>
+                <a:cs typeface="Source Sans Pro ExtraLight"/>
+                <a:sym typeface="Source Sans Pro ExtraLight"/>
+              </a:rPr>
+              <a:t>str_dup</a:t>
+            </a:r>
+            <a:r>
+              <a:rPr dirty="0">
+                <a:latin typeface="Source Sans Pro ExtraLight"/>
+                <a:ea typeface="Source Sans Pro ExtraLight"/>
+                <a:cs typeface="Source Sans Pro ExtraLight"/>
+                <a:sym typeface="Source Sans Pro ExtraLight"/>
+              </a:rPr>
+              <a:t>(fruit, times = 2)</a:t>
+            </a:r>
+            <a:endParaRPr i="1" dirty="0"/>
           </a:p>
           <a:p>
             <a:pPr>
@@ -4744,7 +4839,98 @@
               </a:defRPr>
             </a:pPr>
             <a:r>
-              <a:t>str_split_fixed(</a:t>
+              <a:rPr dirty="0" err="1"/>
+              <a:t>str_split_fixed</a:t>
+            </a:r>
+            <a:r>
+              <a:rPr dirty="0"/>
+              <a:t>(</a:t>
+            </a:r>
+            <a:r>
+              <a:rPr dirty="0">
+                <a:latin typeface="+mn-lt"/>
+                <a:ea typeface="+mn-ea"/>
+                <a:cs typeface="+mn-cs"/>
+                <a:sym typeface="Source Sans Pro Regular"/>
+              </a:rPr>
+              <a:t>string, </a:t>
+            </a:r>
+            <a:r>
+              <a:rPr dirty="0">
+                <a:solidFill>
+                  <a:srgbClr val="D84C79"/>
+                </a:solidFill>
+              </a:rPr>
+              <a:t>pattern</a:t>
+            </a:r>
+            <a:r>
+              <a:rPr dirty="0">
+                <a:latin typeface="+mn-lt"/>
+                <a:ea typeface="+mn-ea"/>
+                <a:cs typeface="+mn-cs"/>
+                <a:sym typeface="Source Sans Pro Regular"/>
+              </a:rPr>
+              <a:t>, n</a:t>
+            </a:r>
+            <a:r>
+              <a:rPr dirty="0"/>
+              <a:t>)</a:t>
+            </a:r>
+            <a:r>
+              <a:rPr dirty="0">
+                <a:latin typeface="+mn-lt"/>
+                <a:ea typeface="+mn-ea"/>
+                <a:cs typeface="+mn-cs"/>
+                <a:sym typeface="Source Sans Pro Regular"/>
+              </a:rPr>
+              <a:t> Split a vector of strings into a matrix of substrings (splitting at occurrences of a pattern match). Also </a:t>
+            </a:r>
+            <a:r>
+              <a:rPr dirty="0" err="1"/>
+              <a:t>str_split</a:t>
+            </a:r>
+            <a:r>
+              <a:rPr dirty="0"/>
+              <a:t>()</a:t>
+            </a:r>
+            <a:r>
+              <a:rPr dirty="0">
+                <a:latin typeface="+mn-lt"/>
+                <a:ea typeface="+mn-ea"/>
+                <a:cs typeface="+mn-cs"/>
+                <a:sym typeface="Source Sans Pro Regular"/>
+              </a:rPr>
+              <a:t> to return a list of substrings and </a:t>
+            </a:r>
+            <a:r>
+              <a:rPr dirty="0" err="1"/>
+              <a:t>str_split_</a:t>
+            </a:r>
+            <a:r>
+              <a:rPr lang="en-US" dirty="0" err="1"/>
+              <a:t>i</a:t>
+            </a:r>
+            <a:r>
+              <a:rPr dirty="0"/>
+              <a:t>()</a:t>
+            </a:r>
+            <a:r>
+              <a:rPr dirty="0">
+                <a:latin typeface="+mn-lt"/>
+                <a:ea typeface="+mn-ea"/>
+                <a:cs typeface="+mn-cs"/>
+                <a:sym typeface="Source Sans Pro Regular"/>
+              </a:rPr>
+              <a:t> to return the </a:t>
+            </a:r>
+            <a:r>
+              <a:rPr lang="en-US">
+                <a:latin typeface="+mn-lt"/>
+                <a:ea typeface="+mn-ea"/>
+                <a:cs typeface="+mn-cs"/>
+                <a:sym typeface="Source Sans Pro Regular"/>
+              </a:rPr>
+              <a:t>i</a:t>
             </a:r>
             <a:r>
               <a:rPr>
@@ -4753,71 +4939,36 @@
                 <a:cs typeface="+mn-cs"/>
                 <a:sym typeface="Source Sans Pro Regular"/>
               </a:rPr>
-              <a:t>string, </a:t>
+              <a:t>th</a:t>
             </a:r>
             <a:r>
-              <a:rPr>
-                <a:solidFill>
-                  <a:srgbClr val="D84C79"/>
-                </a:solidFill>
-              </a:rPr>
-              <a:t>pattern</a:t>
-            </a:r>
-            <a:r>
-              <a:rPr>
+              <a:rPr dirty="0">
                 <a:latin typeface="+mn-lt"/>
                 <a:ea typeface="+mn-ea"/>
                 <a:cs typeface="+mn-cs"/>
                 <a:sym typeface="Source Sans Pro Regular"/>
               </a:rPr>
-              <a:t>, n</a:t>
+              <a:t> substring. </a:t>
             </a:r>
             <a:r>
-              <a:t>)</a:t>
-            </a:r>
-            <a:r>
-              <a:rPr>
-                <a:latin typeface="+mn-lt"/>
-                <a:ea typeface="+mn-ea"/>
-                <a:cs typeface="+mn-cs"/>
-                <a:sym typeface="Source Sans Pro Regular"/>
-              </a:rPr>
-              <a:t> Split a vector of strings into a matrix of substrings (splitting at occurrences of a pattern match). Also </a:t>
-            </a:r>
-            <a:r>
-              <a:t>str_split()</a:t>
-            </a:r>
-            <a:r>
-              <a:rPr>
-                <a:latin typeface="+mn-lt"/>
-                <a:ea typeface="+mn-ea"/>
-                <a:cs typeface="+mn-cs"/>
-                <a:sym typeface="Source Sans Pro Regular"/>
-              </a:rPr>
-              <a:t> to return a list of substrings and </a:t>
-            </a:r>
-            <a:r>
-              <a:t>str_split_n()</a:t>
-            </a:r>
-            <a:r>
-              <a:rPr>
-                <a:latin typeface="+mn-lt"/>
-                <a:ea typeface="+mn-ea"/>
-                <a:cs typeface="+mn-cs"/>
-                <a:sym typeface="Source Sans Pro Regular"/>
-              </a:rPr>
-              <a:t> to return the nth substring. </a:t>
-            </a:r>
-            <a:r>
-              <a:rPr>
+              <a:rPr dirty="0" err="1">
                 <a:latin typeface="Source Sans Pro ExtraLight"/>
                 <a:ea typeface="Source Sans Pro ExtraLight"/>
                 <a:cs typeface="Source Sans Pro ExtraLight"/>
                 <a:sym typeface="Source Sans Pro ExtraLight"/>
               </a:rPr>
-              <a:t>str_split_fixed(sentences, " ", n=3)</a:t>
+              <a:t>str_split_fixed</a:t>
             </a:r>
-            <a:endParaRPr i="1"/>
+            <a:r>
+              <a:rPr dirty="0">
+                <a:latin typeface="Source Sans Pro ExtraLight"/>
+                <a:ea typeface="Source Sans Pro ExtraLight"/>
+                <a:cs typeface="Source Sans Pro ExtraLight"/>
+                <a:sym typeface="Source Sans Pro ExtraLight"/>
+              </a:rPr>
+              <a:t>(sentences, " ", n=3)</a:t>
+            </a:r>
+            <a:endParaRPr i="1" dirty="0"/>
           </a:p>
           <a:p>
             <a:pPr>
@@ -4838,22 +4989,82 @@
               </a:defRPr>
             </a:pPr>
             <a:r>
-              <a:t>str_glue(</a:t>
+              <a:rPr dirty="0" err="1"/>
+              <a:t>str_glue</a:t>
             </a:r>
             <a:r>
-              <a:rPr>
+              <a:rPr dirty="0"/>
+              <a:t>(</a:t>
+            </a:r>
+            <a:r>
+              <a:rPr dirty="0">
                 <a:latin typeface="+mn-lt"/>
                 <a:ea typeface="+mn-ea"/>
                 <a:cs typeface="+mn-cs"/>
                 <a:sym typeface="Source Sans Pro Regular"/>
               </a:rPr>
-              <a:t>…, .sep = "", .envir = parent.frame()</a:t>
+              <a:t>…, .</a:t>
             </a:r>
             <a:r>
+              <a:rPr dirty="0" err="1">
+                <a:latin typeface="+mn-lt"/>
+                <a:ea typeface="+mn-ea"/>
+                <a:cs typeface="+mn-cs"/>
+                <a:sym typeface="Source Sans Pro Regular"/>
+              </a:rPr>
+              <a:t>sep</a:t>
+            </a:r>
+            <a:r>
+              <a:rPr dirty="0">
+                <a:latin typeface="+mn-lt"/>
+                <a:ea typeface="+mn-ea"/>
+                <a:cs typeface="+mn-cs"/>
+                <a:sym typeface="Source Sans Pro Regular"/>
+              </a:rPr>
+              <a:t> = "", .</a:t>
+            </a:r>
+            <a:r>
+              <a:rPr dirty="0" err="1">
+                <a:latin typeface="+mn-lt"/>
+                <a:ea typeface="+mn-ea"/>
+                <a:cs typeface="+mn-cs"/>
+                <a:sym typeface="Source Sans Pro Regular"/>
+              </a:rPr>
+              <a:t>envir</a:t>
+            </a:r>
+            <a:r>
+              <a:rPr dirty="0">
+                <a:latin typeface="+mn-lt"/>
+                <a:ea typeface="+mn-ea"/>
+                <a:cs typeface="+mn-cs"/>
+                <a:sym typeface="Source Sans Pro Regular"/>
+              </a:rPr>
+              <a:t> = </a:t>
+            </a:r>
+            <a:r>
+              <a:rPr dirty="0" err="1">
+                <a:latin typeface="+mn-lt"/>
+                <a:ea typeface="+mn-ea"/>
+                <a:cs typeface="+mn-cs"/>
+                <a:sym typeface="Source Sans Pro Regular"/>
+              </a:rPr>
+              <a:t>parent.frame</a:t>
+            </a:r>
+            <a:r>
+              <a:rPr dirty="0">
+                <a:latin typeface="+mn-lt"/>
+                <a:ea typeface="+mn-ea"/>
+                <a:cs typeface="+mn-cs"/>
+                <a:sym typeface="Source Sans Pro Regular"/>
+              </a:rPr>
+              <a:t>()</a:t>
+            </a:r>
+            <a:r>
+              <a:rPr dirty="0"/>
               <a:t>)</a:t>
             </a:r>
             <a:r>
-              <a:rPr>
+              <a:rPr dirty="0">
                 <a:latin typeface="+mn-lt"/>
                 <a:ea typeface="+mn-ea"/>
                 <a:cs typeface="+mn-cs"/>
@@ -4862,15 +5073,24 @@
               <a:t> Create a string from strings and {expressions} to evaluate. </a:t>
             </a:r>
             <a:r>
-              <a:rPr>
+              <a:rPr dirty="0" err="1">
                 <a:latin typeface="Source Sans Pro ExtraLight"/>
                 <a:ea typeface="Source Sans Pro ExtraLight"/>
                 <a:cs typeface="Source Sans Pro ExtraLight"/>
                 <a:sym typeface="Source Sans Pro ExtraLight"/>
               </a:rPr>
-              <a:t>str_glue("Pi is {pi}")</a:t>
+              <a:t>str_glue</a:t>
             </a:r>
-            <a:endParaRPr i="1"/>
+            <a:r>
+              <a:rPr dirty="0">
+                <a:latin typeface="Source Sans Pro ExtraLight"/>
+                <a:ea typeface="Source Sans Pro ExtraLight"/>
+                <a:cs typeface="Source Sans Pro ExtraLight"/>
+                <a:sym typeface="Source Sans Pro ExtraLight"/>
+              </a:rPr>
+              <a:t>("Pi is {pi}")</a:t>
+            </a:r>
+            <a:endParaRPr i="1" dirty="0"/>
           </a:p>
           <a:p>
             <a:pPr>
@@ -4891,22 +5111,100 @@
               </a:defRPr>
             </a:pPr>
             <a:r>
-              <a:t>str_glue_data(</a:t>
+              <a:rPr dirty="0" err="1"/>
+              <a:t>str_glue_data</a:t>
             </a:r>
             <a:r>
-              <a:rPr>
+              <a:rPr dirty="0"/>
+              <a:t>(</a:t>
+            </a:r>
+            <a:r>
+              <a:rPr dirty="0">
                 <a:latin typeface="+mn-lt"/>
                 <a:ea typeface="+mn-ea"/>
                 <a:cs typeface="+mn-cs"/>
                 <a:sym typeface="Source Sans Pro Regular"/>
               </a:rPr>
-              <a:t>.x, ..., .sep = "", .envir = parent.frame(), .na = "NA"</a:t>
+              <a:t>.x, ..., .</a:t>
             </a:r>
             <a:r>
+              <a:rPr dirty="0" err="1">
+                <a:latin typeface="+mn-lt"/>
+                <a:ea typeface="+mn-ea"/>
+                <a:cs typeface="+mn-cs"/>
+                <a:sym typeface="Source Sans Pro Regular"/>
+              </a:rPr>
+              <a:t>sep</a:t>
+            </a:r>
+            <a:r>
+              <a:rPr dirty="0">
+                <a:latin typeface="+mn-lt"/>
+                <a:ea typeface="+mn-ea"/>
+                <a:cs typeface="+mn-cs"/>
+                <a:sym typeface="Source Sans Pro Regular"/>
+              </a:rPr>
+              <a:t> = "", .</a:t>
+            </a:r>
+            <a:r>
+              <a:rPr dirty="0" err="1">
+                <a:latin typeface="+mn-lt"/>
+                <a:ea typeface="+mn-ea"/>
+                <a:cs typeface="+mn-cs"/>
+                <a:sym typeface="Source Sans Pro Regular"/>
+              </a:rPr>
+              <a:t>envir</a:t>
+            </a:r>
+            <a:r>
+              <a:rPr dirty="0">
+                <a:latin typeface="+mn-lt"/>
+                <a:ea typeface="+mn-ea"/>
+                <a:cs typeface="+mn-cs"/>
+                <a:sym typeface="Source Sans Pro Regular"/>
+              </a:rPr>
+              <a:t> = </a:t>
+            </a:r>
+            <a:r>
+              <a:rPr dirty="0" err="1">
+                <a:latin typeface="+mn-lt"/>
+                <a:ea typeface="+mn-ea"/>
+                <a:cs typeface="+mn-cs"/>
+                <a:sym typeface="Source Sans Pro Regular"/>
+              </a:rPr>
+              <a:t>parent.frame</a:t>
+            </a:r>
+            <a:r>
+              <a:rPr dirty="0">
+                <a:latin typeface="+mn-lt"/>
+                <a:ea typeface="+mn-ea"/>
+                <a:cs typeface="+mn-cs"/>
+                <a:sym typeface="Source Sans Pro Regular"/>
+              </a:rPr>
+              <a:t>(), .</a:t>
+            </a:r>
+            <a:r>
+              <a:rPr dirty="0" err="1">
+                <a:latin typeface="+mn-lt"/>
+                <a:ea typeface="+mn-ea"/>
+                <a:cs typeface="+mn-cs"/>
+                <a:sym typeface="Source Sans Pro Regular"/>
+              </a:rPr>
+              <a:t>na</a:t>
+            </a:r>
+            <a:r>
+              <a:rPr dirty="0">
+                <a:latin typeface="+mn-lt"/>
+                <a:ea typeface="+mn-ea"/>
+                <a:cs typeface="+mn-cs"/>
+                <a:sym typeface="Source Sans Pro Regular"/>
+              </a:rPr>
+              <a:t> = "NA"</a:t>
+            </a:r>
+            <a:r>
+              <a:rPr dirty="0"/>
               <a:t>)</a:t>
             </a:r>
             <a:r>
-              <a:rPr>
+              <a:rPr dirty="0">
                 <a:latin typeface="+mn-lt"/>
                 <a:ea typeface="+mn-ea"/>
                 <a:cs typeface="+mn-cs"/>
@@ -4915,13 +5213,76 @@
               <a:t> Use a data frame, list, or environment to create a string from strings and {expressions} to evaluate. </a:t>
             </a:r>
             <a:r>
-              <a:rPr>
+              <a:rPr dirty="0" err="1">
                 <a:latin typeface="Source Sans Pro ExtraLight"/>
                 <a:ea typeface="Source Sans Pro ExtraLight"/>
                 <a:cs typeface="Source Sans Pro ExtraLight"/>
                 <a:sym typeface="Source Sans Pro ExtraLight"/>
               </a:rPr>
-              <a:t>str_glue_data(mtcars, "{rownames(mtcars)} has {hp} hp")</a:t>
+              <a:t>str_glue_data</a:t>
+            </a:r>
+            <a:r>
+              <a:rPr dirty="0">
+                <a:latin typeface="Source Sans Pro ExtraLight"/>
+                <a:ea typeface="Source Sans Pro ExtraLight"/>
+                <a:cs typeface="Source Sans Pro ExtraLight"/>
+                <a:sym typeface="Source Sans Pro ExtraLight"/>
+              </a:rPr>
+              <a:t>(</a:t>
+            </a:r>
+            <a:r>
+              <a:rPr dirty="0" err="1">
+                <a:latin typeface="Source Sans Pro ExtraLight"/>
+                <a:ea typeface="Source Sans Pro ExtraLight"/>
+                <a:cs typeface="Source Sans Pro ExtraLight"/>
+                <a:sym typeface="Source Sans Pro ExtraLight"/>
+              </a:rPr>
+              <a:t>mtcars</a:t>
+            </a:r>
+            <a:r>
+              <a:rPr dirty="0">
+                <a:latin typeface="Source Sans Pro ExtraLight"/>
+                <a:ea typeface="Source Sans Pro ExtraLight"/>
+                <a:cs typeface="Source Sans Pro ExtraLight"/>
+                <a:sym typeface="Source Sans Pro ExtraLight"/>
+              </a:rPr>
+              <a:t>, "{</a:t>
+            </a:r>
+            <a:r>
+              <a:rPr dirty="0" err="1">
+                <a:latin typeface="Source Sans Pro ExtraLight"/>
+                <a:ea typeface="Source Sans Pro ExtraLight"/>
+                <a:cs typeface="Source Sans Pro ExtraLight"/>
+                <a:sym typeface="Source Sans Pro ExtraLight"/>
+              </a:rPr>
+              <a:t>rownames</a:t>
+            </a:r>
+            <a:r>
+              <a:rPr dirty="0">
+                <a:latin typeface="Source Sans Pro ExtraLight"/>
+                <a:ea typeface="Source Sans Pro ExtraLight"/>
+                <a:cs typeface="Source Sans Pro ExtraLight"/>
+                <a:sym typeface="Source Sans Pro ExtraLight"/>
+              </a:rPr>
+              <a:t>(</a:t>
+            </a:r>
+            <a:r>
+              <a:rPr dirty="0" err="1">
+                <a:latin typeface="Source Sans Pro ExtraLight"/>
+                <a:ea typeface="Source Sans Pro ExtraLight"/>
+                <a:cs typeface="Source Sans Pro ExtraLight"/>
+                <a:sym typeface="Source Sans Pro ExtraLight"/>
+              </a:rPr>
+              <a:t>mtcars</a:t>
+            </a:r>
+            <a:r>
+              <a:rPr dirty="0">
+                <a:latin typeface="Source Sans Pro ExtraLight"/>
+                <a:ea typeface="Source Sans Pro ExtraLight"/>
+                <a:cs typeface="Source Sans Pro ExtraLight"/>
+                <a:sym typeface="Source Sans Pro ExtraLight"/>
+              </a:rPr>
+              <a:t>)} has {hp} hp")</a:t>
             </a:r>
           </a:p>
         </p:txBody>
@@ -5008,7 +5369,7 @@
             <a:effectLst/>
             <a:extLst>
               <a:ext uri="{C572A759-6A51-4108-AA02-DFA0A04FC94B}">
-                <ma14:wrappingTextBoxFlag xmlns="" xmlns:m="http://schemas.openxmlformats.org/officeDocument/2006/math" xmlns:a14="http://schemas.microsoft.com/office/drawing/2010/main" xmlns:ma14="http://schemas.microsoft.com/office/mac/drawingml/2011/main" val="1"/>
+                <ma14:wrappingTextBoxFlag xmlns:ma14="http://schemas.microsoft.com/office/mac/drawingml/2011/main" xmlns:a14="http://schemas.microsoft.com/office/drawing/2010/main" xmlns:m="http://schemas.openxmlformats.org/officeDocument/2006/math" xmlns="" val="1"/>
               </a:ext>
             </a:extLst>
           </p:spPr>
@@ -5238,7 +5599,7 @@
             <a:effectLst/>
             <a:extLst>
               <a:ext uri="{C572A759-6A51-4108-AA02-DFA0A04FC94B}">
-                <ma14:wrappingTextBoxFlag xmlns="" xmlns:m="http://schemas.openxmlformats.org/officeDocument/2006/math" xmlns:a14="http://schemas.microsoft.com/office/drawing/2010/main" xmlns:ma14="http://schemas.microsoft.com/office/mac/drawingml/2011/main" val="1"/>
+                <ma14:wrappingTextBoxFlag xmlns:ma14="http://schemas.microsoft.com/office/mac/drawingml/2011/main" xmlns:a14="http://schemas.microsoft.com/office/drawing/2010/main" xmlns:m="http://schemas.openxmlformats.org/officeDocument/2006/math" xmlns="" val="1"/>
               </a:ext>
             </a:extLst>
           </p:spPr>
@@ -7151,7 +7512,7 @@
             <a:effectLst/>
             <a:extLst>
               <a:ext uri="{C572A759-6A51-4108-AA02-DFA0A04FC94B}">
-                <ma14:wrappingTextBoxFlag xmlns="" xmlns:m="http://schemas.openxmlformats.org/officeDocument/2006/math" xmlns:a14="http://schemas.microsoft.com/office/drawing/2010/main" xmlns:ma14="http://schemas.microsoft.com/office/mac/drawingml/2011/main" val="1"/>
+                <ma14:wrappingTextBoxFlag xmlns:ma14="http://schemas.microsoft.com/office/mac/drawingml/2011/main" xmlns:a14="http://schemas.microsoft.com/office/drawing/2010/main" xmlns:m="http://schemas.openxmlformats.org/officeDocument/2006/math" xmlns="" val="1"/>
               </a:ext>
             </a:extLst>
           </p:spPr>
@@ -7197,7 +7558,7 @@
             <a:effectLst/>
             <a:extLst>
               <a:ext uri="{C572A759-6A51-4108-AA02-DFA0A04FC94B}">
-                <ma14:wrappingTextBoxFlag xmlns="" xmlns:m="http://schemas.openxmlformats.org/officeDocument/2006/math" xmlns:a14="http://schemas.microsoft.com/office/drawing/2010/main" xmlns:ma14="http://schemas.microsoft.com/office/mac/drawingml/2011/main" val="1"/>
+                <ma14:wrappingTextBoxFlag xmlns:ma14="http://schemas.microsoft.com/office/mac/drawingml/2011/main" xmlns:a14="http://schemas.microsoft.com/office/drawing/2010/main" xmlns:m="http://schemas.openxmlformats.org/officeDocument/2006/math" xmlns="" val="1"/>
               </a:ext>
             </a:extLst>
           </p:spPr>
@@ -7908,7 +8269,7 @@
           </a:ln>
           <a:extLst>
             <a:ext uri="{C572A759-6A51-4108-AA02-DFA0A04FC94B}">
-              <ma14:wrappingTextBoxFlag xmlns="" xmlns:m="http://schemas.openxmlformats.org/officeDocument/2006/math" xmlns:a14="http://schemas.microsoft.com/office/drawing/2010/main" xmlns:ma14="http://schemas.microsoft.com/office/mac/drawingml/2011/main" val="1"/>
+              <ma14:wrappingTextBoxFlag xmlns:ma14="http://schemas.microsoft.com/office/mac/drawingml/2011/main" xmlns:a14="http://schemas.microsoft.com/office/drawing/2010/main" xmlns:m="http://schemas.openxmlformats.org/officeDocument/2006/math" xmlns="" val="1"/>
             </a:ext>
           </a:extLst>
         </p:spPr>
@@ -7956,7 +8317,7 @@
           </a:ln>
           <a:extLst>
             <a:ext uri="{C572A759-6A51-4108-AA02-DFA0A04FC94B}">
-              <ma14:wrappingTextBoxFlag xmlns="" xmlns:m="http://schemas.openxmlformats.org/officeDocument/2006/math" xmlns:a14="http://schemas.microsoft.com/office/drawing/2010/main" xmlns:ma14="http://schemas.microsoft.com/office/mac/drawingml/2011/main" val="1"/>
+              <ma14:wrappingTextBoxFlag xmlns:ma14="http://schemas.microsoft.com/office/mac/drawingml/2011/main" xmlns:a14="http://schemas.microsoft.com/office/drawing/2010/main" xmlns:m="http://schemas.openxmlformats.org/officeDocument/2006/math" xmlns="" val="1"/>
             </a:ext>
           </a:extLst>
         </p:spPr>
@@ -9410,7 +9771,7 @@
             <a:effectLst/>
             <a:extLst>
               <a:ext uri="{C572A759-6A51-4108-AA02-DFA0A04FC94B}">
-                <ma14:wrappingTextBoxFlag xmlns="" xmlns:m="http://schemas.openxmlformats.org/officeDocument/2006/math" xmlns:a14="http://schemas.microsoft.com/office/drawing/2010/main" xmlns:ma14="http://schemas.microsoft.com/office/mac/drawingml/2011/main" val="1"/>
+                <ma14:wrappingTextBoxFlag xmlns:ma14="http://schemas.microsoft.com/office/mac/drawingml/2011/main" xmlns:a14="http://schemas.microsoft.com/office/drawing/2010/main" xmlns:m="http://schemas.openxmlformats.org/officeDocument/2006/math" xmlns="" val="1"/>
               </a:ext>
             </a:extLst>
           </p:spPr>
@@ -9490,7 +9851,7 @@
             <a:effectLst/>
             <a:extLst>
               <a:ext uri="{C572A759-6A51-4108-AA02-DFA0A04FC94B}">
-                <ma14:wrappingTextBoxFlag xmlns="" xmlns:m="http://schemas.openxmlformats.org/officeDocument/2006/math" xmlns:a14="http://schemas.microsoft.com/office/drawing/2010/main" xmlns:ma14="http://schemas.microsoft.com/office/mac/drawingml/2011/main" val="1"/>
+                <ma14:wrappingTextBoxFlag xmlns:ma14="http://schemas.microsoft.com/office/mac/drawingml/2011/main" xmlns:a14="http://schemas.microsoft.com/office/drawing/2010/main" xmlns:m="http://schemas.openxmlformats.org/officeDocument/2006/math" xmlns="" val="1"/>
               </a:ext>
             </a:extLst>
           </p:spPr>
@@ -9569,7 +9930,7 @@
           </a:ln>
           <a:extLst>
             <a:ext uri="{C572A759-6A51-4108-AA02-DFA0A04FC94B}">
-              <ma14:wrappingTextBoxFlag xmlns="" xmlns:m="http://schemas.openxmlformats.org/officeDocument/2006/math" xmlns:a14="http://schemas.microsoft.com/office/drawing/2010/main" xmlns:ma14="http://schemas.microsoft.com/office/mac/drawingml/2011/main" val="1"/>
+              <ma14:wrappingTextBoxFlag xmlns:ma14="http://schemas.microsoft.com/office/mac/drawingml/2011/main" xmlns:a14="http://schemas.microsoft.com/office/drawing/2010/main" xmlns:m="http://schemas.openxmlformats.org/officeDocument/2006/math" xmlns="" val="1"/>
             </a:ext>
           </a:extLst>
         </p:spPr>
@@ -9900,7 +10261,7 @@
           </a:ln>
           <a:extLst>
             <a:ext uri="{C572A759-6A51-4108-AA02-DFA0A04FC94B}">
-              <ma14:wrappingTextBoxFlag xmlns="" xmlns:m="http://schemas.openxmlformats.org/officeDocument/2006/math" xmlns:a14="http://schemas.microsoft.com/office/drawing/2010/main" xmlns:ma14="http://schemas.microsoft.com/office/mac/drawingml/2011/main" val="1"/>
+              <ma14:wrappingTextBoxFlag xmlns:ma14="http://schemas.microsoft.com/office/mac/drawingml/2011/main" xmlns:a14="http://schemas.microsoft.com/office/drawing/2010/main" xmlns:m="http://schemas.openxmlformats.org/officeDocument/2006/math" xmlns="" val="1"/>
             </a:ext>
           </a:extLst>
         </p:spPr>
@@ -10157,7 +10518,7 @@
           </a:ln>
           <a:extLst>
             <a:ext uri="{C572A759-6A51-4108-AA02-DFA0A04FC94B}">
-              <ma14:wrappingTextBoxFlag xmlns="" xmlns:m="http://schemas.openxmlformats.org/officeDocument/2006/math" xmlns:a14="http://schemas.microsoft.com/office/drawing/2010/main" xmlns:ma14="http://schemas.microsoft.com/office/mac/drawingml/2011/main" val="1"/>
+              <ma14:wrappingTextBoxFlag xmlns:ma14="http://schemas.microsoft.com/office/mac/drawingml/2011/main" xmlns:a14="http://schemas.microsoft.com/office/drawing/2010/main" xmlns:m="http://schemas.openxmlformats.org/officeDocument/2006/math" xmlns="" val="1"/>
             </a:ext>
           </a:extLst>
         </p:spPr>
@@ -10234,7 +10595,7 @@
           </a:ln>
           <a:extLst>
             <a:ext uri="{C572A759-6A51-4108-AA02-DFA0A04FC94B}">
-              <ma14:wrappingTextBoxFlag xmlns="" xmlns:m="http://schemas.openxmlformats.org/officeDocument/2006/math" xmlns:a14="http://schemas.microsoft.com/office/drawing/2010/main" xmlns:ma14="http://schemas.microsoft.com/office/mac/drawingml/2011/main" val="1"/>
+              <ma14:wrappingTextBoxFlag xmlns:ma14="http://schemas.microsoft.com/office/mac/drawingml/2011/main" xmlns:a14="http://schemas.microsoft.com/office/drawing/2010/main" xmlns:m="http://schemas.openxmlformats.org/officeDocument/2006/math" xmlns="" val="1"/>
             </a:ext>
           </a:extLst>
         </p:spPr>
@@ -10680,7 +11041,7 @@
           </a:ln>
           <a:extLst>
             <a:ext uri="{C572A759-6A51-4108-AA02-DFA0A04FC94B}">
-              <ma14:wrappingTextBoxFlag xmlns="" xmlns:m="http://schemas.openxmlformats.org/officeDocument/2006/math" xmlns:a14="http://schemas.microsoft.com/office/drawing/2010/main" xmlns:ma14="http://schemas.microsoft.com/office/mac/drawingml/2011/main" val="1"/>
+              <ma14:wrappingTextBoxFlag xmlns:ma14="http://schemas.microsoft.com/office/mac/drawingml/2011/main" xmlns:a14="http://schemas.microsoft.com/office/drawing/2010/main" xmlns:m="http://schemas.openxmlformats.org/officeDocument/2006/math" xmlns="" val="1"/>
             </a:ext>
           </a:extLst>
         </p:spPr>
@@ -12537,7 +12898,7 @@
           </a:ln>
           <a:extLst>
             <a:ext uri="{C572A759-6A51-4108-AA02-DFA0A04FC94B}">
-              <ma14:wrappingTextBoxFlag xmlns="" xmlns:m="http://schemas.openxmlformats.org/officeDocument/2006/math" xmlns:a14="http://schemas.microsoft.com/office/drawing/2010/main" xmlns:ma14="http://schemas.microsoft.com/office/mac/drawingml/2011/main" val="1"/>
+              <ma14:wrappingTextBoxFlag xmlns:ma14="http://schemas.microsoft.com/office/mac/drawingml/2011/main" xmlns:a14="http://schemas.microsoft.com/office/drawing/2010/main" xmlns:m="http://schemas.openxmlformats.org/officeDocument/2006/math" xmlns="" val="1"/>
             </a:ext>
           </a:extLst>
         </p:spPr>
@@ -13986,7 +14347,7 @@
           </a:ln>
           <a:extLst>
             <a:ext uri="{C572A759-6A51-4108-AA02-DFA0A04FC94B}">
-              <ma14:wrappingTextBoxFlag xmlns="" xmlns:m="http://schemas.openxmlformats.org/officeDocument/2006/math" xmlns:a14="http://schemas.microsoft.com/office/drawing/2010/main" xmlns:ma14="http://schemas.microsoft.com/office/mac/drawingml/2011/main" val="1"/>
+              <ma14:wrappingTextBoxFlag xmlns:ma14="http://schemas.microsoft.com/office/mac/drawingml/2011/main" xmlns:a14="http://schemas.microsoft.com/office/drawing/2010/main" xmlns:m="http://schemas.openxmlformats.org/officeDocument/2006/math" xmlns="" val="1"/>
             </a:ext>
           </a:extLst>
         </p:spPr>
@@ -14063,7 +14424,7 @@
           </a:ln>
           <a:extLst>
             <a:ext uri="{C572A759-6A51-4108-AA02-DFA0A04FC94B}">
-              <ma14:wrappingTextBoxFlag xmlns="" xmlns:m="http://schemas.openxmlformats.org/officeDocument/2006/math" xmlns:a14="http://schemas.microsoft.com/office/drawing/2010/main" xmlns:ma14="http://schemas.microsoft.com/office/mac/drawingml/2011/main" val="1"/>
+              <ma14:wrappingTextBoxFlag xmlns:ma14="http://schemas.microsoft.com/office/mac/drawingml/2011/main" xmlns:a14="http://schemas.microsoft.com/office/drawing/2010/main" xmlns:m="http://schemas.openxmlformats.org/officeDocument/2006/math" xmlns="" val="1"/>
             </a:ext>
           </a:extLst>
         </p:spPr>
@@ -14520,7 +14881,7 @@
           </a:ln>
           <a:extLst>
             <a:ext uri="{C572A759-6A51-4108-AA02-DFA0A04FC94B}">
-              <ma14:wrappingTextBoxFlag xmlns="" xmlns:m="http://schemas.openxmlformats.org/officeDocument/2006/math" xmlns:a14="http://schemas.microsoft.com/office/drawing/2010/main" xmlns:ma14="http://schemas.microsoft.com/office/mac/drawingml/2011/main" val="1"/>
+              <ma14:wrappingTextBoxFlag xmlns:ma14="http://schemas.microsoft.com/office/mac/drawingml/2011/main" xmlns:a14="http://schemas.microsoft.com/office/drawing/2010/main" xmlns:m="http://schemas.openxmlformats.org/officeDocument/2006/math" xmlns="" val="1"/>
             </a:ext>
           </a:extLst>
         </p:spPr>
@@ -14568,7 +14929,7 @@
           </a:ln>
           <a:extLst>
             <a:ext uri="{C572A759-6A51-4108-AA02-DFA0A04FC94B}">
-              <ma14:wrappingTextBoxFlag xmlns="" xmlns:m="http://schemas.openxmlformats.org/officeDocument/2006/math" xmlns:a14="http://schemas.microsoft.com/office/drawing/2010/main" xmlns:ma14="http://schemas.microsoft.com/office/mac/drawingml/2011/main" val="1"/>
+              <ma14:wrappingTextBoxFlag xmlns:ma14="http://schemas.microsoft.com/office/mac/drawingml/2011/main" xmlns:a14="http://schemas.microsoft.com/office/drawing/2010/main" xmlns:m="http://schemas.openxmlformats.org/officeDocument/2006/math" xmlns="" val="1"/>
             </a:ext>
           </a:extLst>
         </p:spPr>
@@ -14628,7 +14989,7 @@
           </a:ln>
           <a:extLst>
             <a:ext uri="{C572A759-6A51-4108-AA02-DFA0A04FC94B}">
-              <ma14:wrappingTextBoxFlag xmlns="" xmlns:m="http://schemas.openxmlformats.org/officeDocument/2006/math" xmlns:a14="http://schemas.microsoft.com/office/drawing/2010/main" xmlns:ma14="http://schemas.microsoft.com/office/mac/drawingml/2011/main" val="1"/>
+              <ma14:wrappingTextBoxFlag xmlns:ma14="http://schemas.microsoft.com/office/mac/drawingml/2011/main" xmlns:a14="http://schemas.microsoft.com/office/drawing/2010/main" xmlns:m="http://schemas.openxmlformats.org/officeDocument/2006/math" xmlns="" val="1"/>
             </a:ext>
           </a:extLst>
         </p:spPr>
@@ -14676,7 +15037,7 @@
           </a:ln>
           <a:extLst>
             <a:ext uri="{C572A759-6A51-4108-AA02-DFA0A04FC94B}">
-              <ma14:wrappingTextBoxFlag xmlns="" xmlns:m="http://schemas.openxmlformats.org/officeDocument/2006/math" xmlns:a14="http://schemas.microsoft.com/office/drawing/2010/main" xmlns:ma14="http://schemas.microsoft.com/office/mac/drawingml/2011/main" val="1"/>
+              <ma14:wrappingTextBoxFlag xmlns:ma14="http://schemas.microsoft.com/office/mac/drawingml/2011/main" xmlns:a14="http://schemas.microsoft.com/office/drawing/2010/main" xmlns:m="http://schemas.openxmlformats.org/officeDocument/2006/math" xmlns="" val="1"/>
             </a:ext>
           </a:extLst>
         </p:spPr>
@@ -14704,10 +15065,15 @@
               </a:defRPr>
             </a:pPr>
             <a:r>
-              <a:t>str_sub(</a:t>
+              <a:rPr dirty="0" err="1"/>
+              <a:t>str_sub</a:t>
             </a:r>
             <a:r>
-              <a:rPr>
+              <a:rPr dirty="0"/>
+              <a:t>(</a:t>
+            </a:r>
+            <a:r>
+              <a:rPr dirty="0">
                 <a:latin typeface="+mn-lt"/>
                 <a:ea typeface="+mn-ea"/>
                 <a:cs typeface="+mn-cs"/>
@@ -14716,10 +15082,11 @@
               <a:t>string, start = 1L, end = -1L</a:t>
             </a:r>
             <a:r>
+              <a:rPr dirty="0"/>
               <a:t>)</a:t>
             </a:r>
             <a:r>
-              <a:rPr>
+              <a:rPr dirty="0">
                 <a:latin typeface="+mn-lt"/>
                 <a:ea typeface="+mn-ea"/>
                 <a:cs typeface="+mn-cs"/>
@@ -14728,7 +15095,7 @@
               <a:t> Extract substrings from a character vector.</a:t>
             </a:r>
             <a:r>
-              <a:rPr i="1">
+              <a:rPr i="1" dirty="0">
                 <a:latin typeface="+mn-lt"/>
                 <a:ea typeface="+mn-ea"/>
                 <a:cs typeface="+mn-cs"/>
@@ -14737,15 +15104,42 @@
               <a:t> </a:t>
             </a:r>
             <a:r>
-              <a:rPr>
+              <a:rPr dirty="0" err="1">
                 <a:latin typeface="Source Sans Pro ExtraLight"/>
                 <a:ea typeface="Source Sans Pro ExtraLight"/>
                 <a:cs typeface="Source Sans Pro ExtraLight"/>
                 <a:sym typeface="Source Sans Pro ExtraLight"/>
               </a:rPr>
-              <a:t>str_sub(fruit, 1, 3); str_sub(fruit, -2)</a:t>
+              <a:t>str_sub</a:t>
             </a:r>
-            <a:endParaRPr i="1"/>
+            <a:r>
+              <a:rPr dirty="0">
+                <a:latin typeface="Source Sans Pro ExtraLight"/>
+                <a:ea typeface="Source Sans Pro ExtraLight"/>
+                <a:cs typeface="Source Sans Pro ExtraLight"/>
+                <a:sym typeface="Source Sans Pro ExtraLight"/>
+              </a:rPr>
+              <a:t>(fruit, 1, 3); </a:t>
+            </a:r>
+            <a:r>
+              <a:rPr dirty="0" err="1">
+                <a:latin typeface="Source Sans Pro ExtraLight"/>
+                <a:ea typeface="Source Sans Pro ExtraLight"/>
+                <a:cs typeface="Source Sans Pro ExtraLight"/>
+                <a:sym typeface="Source Sans Pro ExtraLight"/>
+              </a:rPr>
+              <a:t>str_sub</a:t>
+            </a:r>
+            <a:r>
+              <a:rPr dirty="0">
+                <a:latin typeface="Source Sans Pro ExtraLight"/>
+                <a:ea typeface="Source Sans Pro ExtraLight"/>
+                <a:cs typeface="Source Sans Pro ExtraLight"/>
+                <a:sym typeface="Source Sans Pro ExtraLight"/>
+              </a:rPr>
+              <a:t>(fruit, -2)</a:t>
+            </a:r>
+            <a:endParaRPr i="1" dirty="0"/>
           </a:p>
           <a:p>
             <a:pPr>
@@ -14766,10 +15160,15 @@
               </a:defRPr>
             </a:pPr>
             <a:r>
-              <a:t>str_subset(</a:t>
+              <a:rPr dirty="0" err="1"/>
+              <a:t>str_subset</a:t>
             </a:r>
             <a:r>
-              <a:rPr>
+              <a:rPr dirty="0"/>
+              <a:t>(</a:t>
+            </a:r>
+            <a:r>
+              <a:rPr dirty="0">
                 <a:latin typeface="+mn-lt"/>
                 <a:ea typeface="+mn-ea"/>
                 <a:cs typeface="+mn-cs"/>
@@ -14778,7 +15177,7 @@
               <a:t>string, </a:t>
             </a:r>
             <a:r>
-              <a:rPr>
+              <a:rPr dirty="0">
                 <a:solidFill>
                   <a:srgbClr val="D84C79"/>
                 </a:solidFill>
@@ -14786,7 +15185,7 @@
               <a:t>pattern</a:t>
             </a:r>
             <a:r>
-              <a:rPr>
+              <a:rPr dirty="0">
                 <a:latin typeface="+mn-lt"/>
                 <a:ea typeface="+mn-ea"/>
                 <a:cs typeface="+mn-cs"/>
@@ -14795,10 +15194,11 @@
               <a:t>, negate = FALSE</a:t>
             </a:r>
             <a:r>
+              <a:rPr dirty="0"/>
               <a:t>)</a:t>
             </a:r>
             <a:r>
-              <a:rPr>
+              <a:rPr dirty="0">
                 <a:latin typeface="+mn-lt"/>
                 <a:ea typeface="+mn-ea"/>
                 <a:cs typeface="+mn-cs"/>
@@ -14807,15 +15207,24 @@
               <a:t> Return only the strings that contain a pattern match. </a:t>
             </a:r>
             <a:r>
-              <a:rPr>
+              <a:rPr dirty="0" err="1">
                 <a:latin typeface="Source Sans Pro ExtraLight"/>
                 <a:ea typeface="Source Sans Pro ExtraLight"/>
                 <a:cs typeface="Source Sans Pro ExtraLight"/>
                 <a:sym typeface="Source Sans Pro ExtraLight"/>
               </a:rPr>
-              <a:t>str_subset(fruit, "p")</a:t>
+              <a:t>str_subset</a:t>
             </a:r>
-            <a:endParaRPr i="1"/>
+            <a:r>
+              <a:rPr dirty="0">
+                <a:latin typeface="Source Sans Pro ExtraLight"/>
+                <a:ea typeface="Source Sans Pro ExtraLight"/>
+                <a:cs typeface="Source Sans Pro ExtraLight"/>
+                <a:sym typeface="Source Sans Pro ExtraLight"/>
+              </a:rPr>
+              <a:t>(fruit, "p")</a:t>
+            </a:r>
+            <a:endParaRPr i="1" dirty="0"/>
           </a:p>
           <a:p>
             <a:pPr>
@@ -14836,10 +15245,15 @@
               </a:defRPr>
             </a:pPr>
             <a:r>
-              <a:t>str_extract(</a:t>
+              <a:rPr dirty="0" err="1"/>
+              <a:t>str_extract</a:t>
             </a:r>
             <a:r>
-              <a:rPr>
+              <a:rPr dirty="0"/>
+              <a:t>(</a:t>
+            </a:r>
+            <a:r>
+              <a:rPr dirty="0">
                 <a:latin typeface="+mn-lt"/>
                 <a:ea typeface="+mn-ea"/>
                 <a:cs typeface="+mn-cs"/>
@@ -14848,7 +15262,7 @@
               <a:t>string, </a:t>
             </a:r>
             <a:r>
-              <a:rPr>
+              <a:rPr dirty="0">
                 <a:solidFill>
                   <a:srgbClr val="D84C79"/>
                 </a:solidFill>
@@ -14856,10 +15270,11 @@
               <a:t>pattern</a:t>
             </a:r>
             <a:r>
+              <a:rPr dirty="0"/>
               <a:t>)</a:t>
             </a:r>
             <a:r>
-              <a:rPr>
+              <a:rPr dirty="0">
                 <a:latin typeface="+mn-lt"/>
                 <a:ea typeface="+mn-ea"/>
                 <a:cs typeface="+mn-cs"/>
@@ -14868,10 +15283,15 @@
               <a:t> Return the first pattern match found in each string, as a vector. Also </a:t>
             </a:r>
             <a:r>
-              <a:t>str_extract_all() </a:t>
+              <a:rPr dirty="0" err="1"/>
+              <a:t>str_extract_all</a:t>
             </a:r>
             <a:r>
-              <a:rPr>
+              <a:rPr dirty="0"/>
+              <a:t>() </a:t>
+            </a:r>
+            <a:r>
+              <a:rPr dirty="0">
                 <a:latin typeface="+mn-lt"/>
                 <a:ea typeface="+mn-ea"/>
                 <a:cs typeface="+mn-cs"/>
@@ -14880,13 +15300,40 @@
               <a:t>to return every pattern match. </a:t>
             </a:r>
             <a:r>
-              <a:rPr>
+              <a:rPr dirty="0" err="1">
                 <a:latin typeface="Source Sans Pro ExtraLight"/>
                 <a:ea typeface="Source Sans Pro ExtraLight"/>
                 <a:cs typeface="Source Sans Pro ExtraLight"/>
                 <a:sym typeface="Source Sans Pro ExtraLight"/>
               </a:rPr>
-              <a:t>str_extract(fruit, "[aeiou]")</a:t>
+              <a:t>str_extract</a:t>
+            </a:r>
+            <a:r>
+              <a:rPr dirty="0">
+                <a:latin typeface="Source Sans Pro ExtraLight"/>
+                <a:ea typeface="Source Sans Pro ExtraLight"/>
+                <a:cs typeface="Source Sans Pro ExtraLight"/>
+                <a:sym typeface="Source Sans Pro ExtraLight"/>
+              </a:rPr>
+              <a:t>(fruit, "[</a:t>
+            </a:r>
+            <a:r>
+              <a:rPr dirty="0" err="1">
+                <a:latin typeface="Source Sans Pro ExtraLight"/>
+                <a:ea typeface="Source Sans Pro ExtraLight"/>
+                <a:cs typeface="Source Sans Pro ExtraLight"/>
+                <a:sym typeface="Source Sans Pro ExtraLight"/>
+              </a:rPr>
+              <a:t>aeiou</a:t>
+            </a:r>
+            <a:r>
+              <a:rPr dirty="0">
+                <a:latin typeface="Source Sans Pro ExtraLight"/>
+                <a:ea typeface="Source Sans Pro ExtraLight"/>
+                <a:cs typeface="Source Sans Pro ExtraLight"/>
+                <a:sym typeface="Source Sans Pro ExtraLight"/>
+              </a:rPr>
+              <a:t>]")</a:t>
             </a:r>
           </a:p>
           <a:p>
@@ -14908,10 +15355,15 @@
               </a:defRPr>
             </a:pPr>
             <a:r>
-              <a:t>str_match(</a:t>
+              <a:rPr dirty="0" err="1"/>
+              <a:t>str_match</a:t>
             </a:r>
             <a:r>
-              <a:rPr>
+              <a:rPr dirty="0"/>
+              <a:t>(</a:t>
+            </a:r>
+            <a:r>
+              <a:rPr dirty="0">
                 <a:latin typeface="+mn-lt"/>
                 <a:ea typeface="+mn-ea"/>
                 <a:cs typeface="+mn-cs"/>
@@ -14920,7 +15372,7 @@
               <a:t>string, </a:t>
             </a:r>
             <a:r>
-              <a:rPr>
+              <a:rPr dirty="0">
                 <a:solidFill>
                   <a:srgbClr val="D84C79"/>
                 </a:solidFill>
@@ -14928,10 +15380,11 @@
               <a:t>pattern</a:t>
             </a:r>
             <a:r>
+              <a:rPr dirty="0"/>
               <a:t>)</a:t>
             </a:r>
             <a:r>
-              <a:rPr>
+              <a:rPr dirty="0">
                 <a:latin typeface="+mn-lt"/>
                 <a:ea typeface="+mn-ea"/>
                 <a:cs typeface="+mn-cs"/>
@@ -14940,7 +15393,7 @@
               <a:t> Return the </a:t>
             </a:r>
             <a:br>
-              <a:rPr>
+              <a:rPr dirty="0">
                 <a:latin typeface="+mn-lt"/>
                 <a:ea typeface="+mn-ea"/>
                 <a:cs typeface="+mn-cs"/>
@@ -14948,7 +15401,7 @@
               </a:rPr>
             </a:br>
             <a:r>
-              <a:rPr>
+              <a:rPr dirty="0">
                 <a:latin typeface="+mn-lt"/>
                 <a:ea typeface="+mn-ea"/>
                 <a:cs typeface="+mn-cs"/>
@@ -14957,7 +15410,7 @@
               <a:t>first pattern match found in each string, as </a:t>
             </a:r>
             <a:br>
-              <a:rPr>
+              <a:rPr dirty="0">
                 <a:latin typeface="+mn-lt"/>
                 <a:ea typeface="+mn-ea"/>
                 <a:cs typeface="+mn-cs"/>
@@ -14965,7 +15418,7 @@
               </a:rPr>
             </a:br>
             <a:r>
-              <a:rPr>
+              <a:rPr dirty="0">
                 <a:latin typeface="+mn-lt"/>
                 <a:ea typeface="+mn-ea"/>
                 <a:cs typeface="+mn-cs"/>
@@ -14974,10 +15427,15 @@
               <a:t>a matrix with a column for each ( ) group in pattern. Also </a:t>
             </a:r>
             <a:r>
-              <a:t>str_match_all()</a:t>
+              <a:rPr dirty="0" err="1"/>
+              <a:t>str_match_all</a:t>
             </a:r>
             <a:r>
-              <a:rPr>
+              <a:rPr dirty="0"/>
+              <a:t>()</a:t>
+            </a:r>
+            <a:r>
+              <a:rPr dirty="0">
                 <a:latin typeface="+mn-lt"/>
                 <a:ea typeface="+mn-ea"/>
                 <a:cs typeface="+mn-cs"/>
@@ -14986,16 +15444,44 @@
               <a:t>.</a:t>
             </a:r>
             <a:r>
+              <a:rPr dirty="0"/>
               <a:t> </a:t>
             </a:r>
             <a:r>
-              <a:rPr>
+              <a:rPr dirty="0" err="1">
                 <a:latin typeface="Source Sans Pro ExtraLight"/>
                 <a:ea typeface="Source Sans Pro ExtraLight"/>
                 <a:cs typeface="Source Sans Pro ExtraLight"/>
                 <a:sym typeface="Source Sans Pro ExtraLight"/>
               </a:rPr>
-              <a:t>str_match(sentences, "(a|the) ([^ +])")</a:t>
+              <a:t>str_match</a:t>
+            </a:r>
+            <a:r>
+              <a:rPr dirty="0">
+                <a:latin typeface="Source Sans Pro ExtraLight"/>
+                <a:ea typeface="Source Sans Pro ExtraLight"/>
+                <a:cs typeface="Source Sans Pro ExtraLight"/>
+                <a:sym typeface="Source Sans Pro ExtraLight"/>
+              </a:rPr>
+              <a:t>(sentences, "(</a:t>
+            </a:r>
+            <a:r>
+              <a:rPr dirty="0" err="1">
+                <a:latin typeface="Source Sans Pro ExtraLight"/>
+                <a:ea typeface="Source Sans Pro ExtraLight"/>
+                <a:cs typeface="Source Sans Pro ExtraLight"/>
+                <a:sym typeface="Source Sans Pro ExtraLight"/>
+              </a:rPr>
+              <a:t>a|the</a:t>
+            </a:r>
+            <a:r>
+              <a:rPr dirty="0">
+                <a:latin typeface="Source Sans Pro ExtraLight"/>
+                <a:ea typeface="Source Sans Pro ExtraLight"/>
+                <a:cs typeface="Source Sans Pro ExtraLight"/>
+                <a:sym typeface="Source Sans Pro ExtraLight"/>
+              </a:rPr>
+              <a:t>) ([^ +])")</a:t>
             </a:r>
           </a:p>
         </p:txBody>
@@ -17351,7 +17837,7 @@
           </a:ln>
           <a:extLst>
             <a:ext uri="{C572A759-6A51-4108-AA02-DFA0A04FC94B}">
-              <ma14:wrappingTextBoxFlag xmlns="" xmlns:m="http://schemas.openxmlformats.org/officeDocument/2006/math" xmlns:a14="http://schemas.microsoft.com/office/drawing/2010/main" xmlns:ma14="http://schemas.microsoft.com/office/mac/drawingml/2011/main" val="1"/>
+              <ma14:wrappingTextBoxFlag xmlns:ma14="http://schemas.microsoft.com/office/mac/drawingml/2011/main" xmlns:a14="http://schemas.microsoft.com/office/drawing/2010/main" xmlns:m="http://schemas.openxmlformats.org/officeDocument/2006/math" xmlns="" val="1"/>
             </a:ext>
           </a:extLst>
         </p:spPr>
@@ -18325,7 +18811,7 @@
             <a:effectLst/>
             <a:extLst>
               <a:ext uri="{C572A759-6A51-4108-AA02-DFA0A04FC94B}">
-                <ma14:wrappingTextBoxFlag xmlns="" xmlns:m="http://schemas.openxmlformats.org/officeDocument/2006/math" xmlns:a14="http://schemas.microsoft.com/office/drawing/2010/main" xmlns:ma14="http://schemas.microsoft.com/office/mac/drawingml/2011/main" val="1"/>
+                <ma14:wrappingTextBoxFlag xmlns:ma14="http://schemas.microsoft.com/office/mac/drawingml/2011/main" xmlns:a14="http://schemas.microsoft.com/office/drawing/2010/main" xmlns:m="http://schemas.openxmlformats.org/officeDocument/2006/math" xmlns="" val="1"/>
               </a:ext>
             </a:extLst>
           </p:spPr>
@@ -18371,7 +18857,7 @@
             <a:effectLst/>
             <a:extLst>
               <a:ext uri="{C572A759-6A51-4108-AA02-DFA0A04FC94B}">
-                <ma14:wrappingTextBoxFlag xmlns="" xmlns:m="http://schemas.openxmlformats.org/officeDocument/2006/math" xmlns:a14="http://schemas.microsoft.com/office/drawing/2010/main" xmlns:ma14="http://schemas.microsoft.com/office/mac/drawingml/2011/main" val="1"/>
+                <ma14:wrappingTextBoxFlag xmlns:ma14="http://schemas.microsoft.com/office/mac/drawingml/2011/main" xmlns:a14="http://schemas.microsoft.com/office/drawing/2010/main" xmlns:m="http://schemas.openxmlformats.org/officeDocument/2006/math" xmlns="" val="1"/>
               </a:ext>
             </a:extLst>
           </p:spPr>
@@ -19073,7 +19559,7 @@
             <a:effectLst/>
             <a:extLst>
               <a:ext uri="{C572A759-6A51-4108-AA02-DFA0A04FC94B}">
-                <ma14:wrappingTextBoxFlag xmlns="" xmlns:m="http://schemas.openxmlformats.org/officeDocument/2006/math" xmlns:a14="http://schemas.microsoft.com/office/drawing/2010/main" xmlns:ma14="http://schemas.microsoft.com/office/mac/drawingml/2011/main" val="1"/>
+                <ma14:wrappingTextBoxFlag xmlns:ma14="http://schemas.microsoft.com/office/mac/drawingml/2011/main" xmlns:a14="http://schemas.microsoft.com/office/drawing/2010/main" xmlns:m="http://schemas.openxmlformats.org/officeDocument/2006/math" xmlns="" val="1"/>
               </a:ext>
             </a:extLst>
           </p:spPr>
@@ -19119,7 +19605,7 @@
             <a:effectLst/>
             <a:extLst>
               <a:ext uri="{C572A759-6A51-4108-AA02-DFA0A04FC94B}">
-                <ma14:wrappingTextBoxFlag xmlns="" xmlns:m="http://schemas.openxmlformats.org/officeDocument/2006/math" xmlns:a14="http://schemas.microsoft.com/office/drawing/2010/main" xmlns:ma14="http://schemas.microsoft.com/office/mac/drawingml/2011/main" val="1"/>
+                <ma14:wrappingTextBoxFlag xmlns:ma14="http://schemas.microsoft.com/office/mac/drawingml/2011/main" xmlns:a14="http://schemas.microsoft.com/office/drawing/2010/main" xmlns:m="http://schemas.openxmlformats.org/officeDocument/2006/math" xmlns="" val="1"/>
               </a:ext>
             </a:extLst>
           </p:spPr>
@@ -31230,7 +31716,7 @@
           </a:ln>
           <a:extLst>
             <a:ext uri="{C572A759-6A51-4108-AA02-DFA0A04FC94B}">
-              <ma14:wrappingTextBoxFlag xmlns="" xmlns:m="http://schemas.openxmlformats.org/officeDocument/2006/math" xmlns:a14="http://schemas.microsoft.com/office/drawing/2010/main" xmlns:ma14="http://schemas.microsoft.com/office/mac/drawingml/2011/main" val="1"/>
+              <ma14:wrappingTextBoxFlag xmlns:ma14="http://schemas.microsoft.com/office/mac/drawingml/2011/main" xmlns:a14="http://schemas.microsoft.com/office/drawing/2010/main" xmlns:m="http://schemas.openxmlformats.org/officeDocument/2006/math" xmlns="" val="1"/>
             </a:ext>
           </a:extLst>
         </p:spPr>
@@ -31862,7 +32348,7 @@
           </a:ln>
           <a:extLst>
             <a:ext uri="{C572A759-6A51-4108-AA02-DFA0A04FC94B}">
-              <ma14:wrappingTextBoxFlag xmlns="" xmlns:m="http://schemas.openxmlformats.org/officeDocument/2006/math" xmlns:a14="http://schemas.microsoft.com/office/drawing/2010/main" xmlns:ma14="http://schemas.microsoft.com/office/mac/drawingml/2011/main" val="1"/>
+              <ma14:wrappingTextBoxFlag xmlns:ma14="http://schemas.microsoft.com/office/mac/drawingml/2011/main" xmlns:a14="http://schemas.microsoft.com/office/drawing/2010/main" xmlns:m="http://schemas.openxmlformats.org/officeDocument/2006/math" xmlns="" val="1"/>
             </a:ext>
           </a:extLst>
         </p:spPr>
@@ -31939,7 +32425,7 @@
           </a:ln>
           <a:extLst>
             <a:ext uri="{C572A759-6A51-4108-AA02-DFA0A04FC94B}">
-              <ma14:wrappingTextBoxFlag xmlns="" xmlns:m="http://schemas.openxmlformats.org/officeDocument/2006/math" xmlns:a14="http://schemas.microsoft.com/office/drawing/2010/main" xmlns:ma14="http://schemas.microsoft.com/office/mac/drawingml/2011/main" val="1"/>
+              <ma14:wrappingTextBoxFlag xmlns:ma14="http://schemas.microsoft.com/office/mac/drawingml/2011/main" xmlns:a14="http://schemas.microsoft.com/office/drawing/2010/main" xmlns:m="http://schemas.openxmlformats.org/officeDocument/2006/math" xmlns="" val="1"/>
             </a:ext>
           </a:extLst>
         </p:spPr>
@@ -32016,7 +32502,7 @@
           </a:ln>
           <a:extLst>
             <a:ext uri="{C572A759-6A51-4108-AA02-DFA0A04FC94B}">
-              <ma14:wrappingTextBoxFlag xmlns="" xmlns:m="http://schemas.openxmlformats.org/officeDocument/2006/math" xmlns:a14="http://schemas.microsoft.com/office/drawing/2010/main" xmlns:ma14="http://schemas.microsoft.com/office/mac/drawingml/2011/main" val="1"/>
+              <ma14:wrappingTextBoxFlag xmlns:ma14="http://schemas.microsoft.com/office/mac/drawingml/2011/main" xmlns:a14="http://schemas.microsoft.com/office/drawing/2010/main" xmlns:m="http://schemas.openxmlformats.org/officeDocument/2006/math" xmlns="" val="1"/>
             </a:ext>
           </a:extLst>
         </p:spPr>
@@ -32179,7 +32665,7 @@
           </a:ln>
           <a:extLst>
             <a:ext uri="{C572A759-6A51-4108-AA02-DFA0A04FC94B}">
-              <ma14:wrappingTextBoxFlag xmlns="" xmlns:m="http://schemas.openxmlformats.org/officeDocument/2006/math" xmlns:a14="http://schemas.microsoft.com/office/drawing/2010/main" xmlns:ma14="http://schemas.microsoft.com/office/mac/drawingml/2011/main" val="1"/>
+              <ma14:wrappingTextBoxFlag xmlns:ma14="http://schemas.microsoft.com/office/mac/drawingml/2011/main" xmlns:a14="http://schemas.microsoft.com/office/drawing/2010/main" xmlns:m="http://schemas.openxmlformats.org/officeDocument/2006/math" xmlns="" val="1"/>
             </a:ext>
           </a:extLst>
         </p:spPr>
@@ -32349,7 +32835,7 @@
           </a:ln>
           <a:extLst>
             <a:ext uri="{C572A759-6A51-4108-AA02-DFA0A04FC94B}">
-              <ma14:wrappingTextBoxFlag xmlns="" xmlns:m="http://schemas.openxmlformats.org/officeDocument/2006/math" xmlns:a14="http://schemas.microsoft.com/office/drawing/2010/main" xmlns:ma14="http://schemas.microsoft.com/office/mac/drawingml/2011/main" val="1"/>
+              <ma14:wrappingTextBoxFlag xmlns:ma14="http://schemas.microsoft.com/office/mac/drawingml/2011/main" xmlns:a14="http://schemas.microsoft.com/office/drawing/2010/main" xmlns:m="http://schemas.openxmlformats.org/officeDocument/2006/math" xmlns="" val="1"/>
             </a:ext>
           </a:extLst>
         </p:spPr>
@@ -32433,7 +32919,7 @@
           </a:ln>
           <a:extLst>
             <a:ext uri="{C572A759-6A51-4108-AA02-DFA0A04FC94B}">
-              <ma14:wrappingTextBoxFlag xmlns="" xmlns:m="http://schemas.openxmlformats.org/officeDocument/2006/math" xmlns:a14="http://schemas.microsoft.com/office/drawing/2010/main" xmlns:ma14="http://schemas.microsoft.com/office/mac/drawingml/2011/main" val="1"/>
+              <ma14:wrappingTextBoxFlag xmlns:ma14="http://schemas.microsoft.com/office/mac/drawingml/2011/main" xmlns:a14="http://schemas.microsoft.com/office/drawing/2010/main" xmlns:m="http://schemas.openxmlformats.org/officeDocument/2006/math" xmlns="" val="1"/>
             </a:ext>
           </a:extLst>
         </p:spPr>
@@ -32682,7 +33168,7 @@
           </a:ln>
           <a:extLst>
             <a:ext uri="{C572A759-6A51-4108-AA02-DFA0A04FC94B}">
-              <ma14:wrappingTextBoxFlag xmlns="" xmlns:m="http://schemas.openxmlformats.org/officeDocument/2006/math" xmlns:a14="http://schemas.microsoft.com/office/drawing/2010/main" xmlns:ma14="http://schemas.microsoft.com/office/mac/drawingml/2011/main" val="1"/>
+              <ma14:wrappingTextBoxFlag xmlns:ma14="http://schemas.microsoft.com/office/mac/drawingml/2011/main" xmlns:a14="http://schemas.microsoft.com/office/drawing/2010/main" xmlns:m="http://schemas.openxmlformats.org/officeDocument/2006/math" xmlns="" val="1"/>
             </a:ext>
           </a:extLst>
         </p:spPr>
@@ -32725,7 +33211,7 @@
           </a:ln>
           <a:extLst>
             <a:ext uri="{C572A759-6A51-4108-AA02-DFA0A04FC94B}">
-              <ma14:wrappingTextBoxFlag xmlns="" xmlns:m="http://schemas.openxmlformats.org/officeDocument/2006/math" xmlns:a14="http://schemas.microsoft.com/office/drawing/2010/main" xmlns:ma14="http://schemas.microsoft.com/office/mac/drawingml/2011/main" val="1"/>
+              <ma14:wrappingTextBoxFlag xmlns:ma14="http://schemas.microsoft.com/office/mac/drawingml/2011/main" xmlns:a14="http://schemas.microsoft.com/office/drawing/2010/main" xmlns:m="http://schemas.openxmlformats.org/officeDocument/2006/math" xmlns="" val="1"/>
             </a:ext>
           </a:extLst>
         </p:spPr>
@@ -32805,7 +33291,7 @@
           </a:ln>
           <a:extLst>
             <a:ext uri="{C572A759-6A51-4108-AA02-DFA0A04FC94B}">
-              <ma14:wrappingTextBoxFlag xmlns="" xmlns:m="http://schemas.openxmlformats.org/officeDocument/2006/math" xmlns:a14="http://schemas.microsoft.com/office/drawing/2010/main" xmlns:ma14="http://schemas.microsoft.com/office/mac/drawingml/2011/main" val="1"/>
+              <ma14:wrappingTextBoxFlag xmlns:ma14="http://schemas.microsoft.com/office/mac/drawingml/2011/main" xmlns:a14="http://schemas.microsoft.com/office/drawing/2010/main" xmlns:m="http://schemas.openxmlformats.org/officeDocument/2006/math" xmlns="" val="1"/>
             </a:ext>
           </a:extLst>
         </p:spPr>
@@ -32848,7 +33334,7 @@
           </a:ln>
           <a:extLst>
             <a:ext uri="{C572A759-6A51-4108-AA02-DFA0A04FC94B}">
-              <ma14:wrappingTextBoxFlag xmlns="" xmlns:m="http://schemas.openxmlformats.org/officeDocument/2006/math" xmlns:a14="http://schemas.microsoft.com/office/drawing/2010/main" xmlns:ma14="http://schemas.microsoft.com/office/mac/drawingml/2011/main" val="1"/>
+              <ma14:wrappingTextBoxFlag xmlns:ma14="http://schemas.microsoft.com/office/mac/drawingml/2011/main" xmlns:a14="http://schemas.microsoft.com/office/drawing/2010/main" xmlns:m="http://schemas.openxmlformats.org/officeDocument/2006/math" xmlns="" val="1"/>
             </a:ext>
           </a:extLst>
         </p:spPr>
@@ -32928,7 +33414,7 @@
           </a:ln>
           <a:extLst>
             <a:ext uri="{C572A759-6A51-4108-AA02-DFA0A04FC94B}">
-              <ma14:wrappingTextBoxFlag xmlns="" xmlns:m="http://schemas.openxmlformats.org/officeDocument/2006/math" xmlns:a14="http://schemas.microsoft.com/office/drawing/2010/main" xmlns:ma14="http://schemas.microsoft.com/office/mac/drawingml/2011/main" val="1"/>
+              <ma14:wrappingTextBoxFlag xmlns:ma14="http://schemas.microsoft.com/office/mac/drawingml/2011/main" xmlns:a14="http://schemas.microsoft.com/office/drawing/2010/main" xmlns:m="http://schemas.openxmlformats.org/officeDocument/2006/math" xmlns="" val="1"/>
             </a:ext>
           </a:extLst>
         </p:spPr>
@@ -33002,7 +33488,7 @@
           </a:ln>
           <a:extLst>
             <a:ext uri="{C572A759-6A51-4108-AA02-DFA0A04FC94B}">
-              <ma14:wrappingTextBoxFlag xmlns="" xmlns:m="http://schemas.openxmlformats.org/officeDocument/2006/math" xmlns:a14="http://schemas.microsoft.com/office/drawing/2010/main" xmlns:ma14="http://schemas.microsoft.com/office/mac/drawingml/2011/main" val="1"/>
+              <ma14:wrappingTextBoxFlag xmlns:ma14="http://schemas.microsoft.com/office/mac/drawingml/2011/main" xmlns:a14="http://schemas.microsoft.com/office/drawing/2010/main" xmlns:m="http://schemas.openxmlformats.org/officeDocument/2006/math" xmlns="" val="1"/>
             </a:ext>
           </a:extLst>
         </p:spPr>
@@ -33045,7 +33531,7 @@
           </a:ln>
           <a:extLst>
             <a:ext uri="{C572A759-6A51-4108-AA02-DFA0A04FC94B}">
-              <ma14:wrappingTextBoxFlag xmlns="" xmlns:m="http://schemas.openxmlformats.org/officeDocument/2006/math" xmlns:a14="http://schemas.microsoft.com/office/drawing/2010/main" xmlns:ma14="http://schemas.microsoft.com/office/mac/drawingml/2011/main" val="1"/>
+              <ma14:wrappingTextBoxFlag xmlns:ma14="http://schemas.microsoft.com/office/mac/drawingml/2011/main" xmlns:a14="http://schemas.microsoft.com/office/drawing/2010/main" xmlns:m="http://schemas.openxmlformats.org/officeDocument/2006/math" xmlns="" val="1"/>
             </a:ext>
           </a:extLst>
         </p:spPr>
@@ -33094,7 +33580,7 @@
           </a:ln>
           <a:extLst>
             <a:ext uri="{C572A759-6A51-4108-AA02-DFA0A04FC94B}">
-              <ma14:wrappingTextBoxFlag xmlns="" xmlns:m="http://schemas.openxmlformats.org/officeDocument/2006/math" xmlns:a14="http://schemas.microsoft.com/office/drawing/2010/main" xmlns:ma14="http://schemas.microsoft.com/office/mac/drawingml/2011/main" val="1"/>
+              <ma14:wrappingTextBoxFlag xmlns:ma14="http://schemas.microsoft.com/office/mac/drawingml/2011/main" xmlns:a14="http://schemas.microsoft.com/office/drawing/2010/main" xmlns:m="http://schemas.openxmlformats.org/officeDocument/2006/math" xmlns="" val="1"/>
             </a:ext>
           </a:extLst>
         </p:spPr>
@@ -33144,7 +33630,7 @@
           </a:ln>
           <a:extLst>
             <a:ext uri="{C572A759-6A51-4108-AA02-DFA0A04FC94B}">
-              <ma14:wrappingTextBoxFlag xmlns="" xmlns:m="http://schemas.openxmlformats.org/officeDocument/2006/math" xmlns:a14="http://schemas.microsoft.com/office/drawing/2010/main" xmlns:ma14="http://schemas.microsoft.com/office/mac/drawingml/2011/main" val="1"/>
+              <ma14:wrappingTextBoxFlag xmlns:ma14="http://schemas.microsoft.com/office/mac/drawingml/2011/main" xmlns:a14="http://schemas.microsoft.com/office/drawing/2010/main" xmlns:m="http://schemas.openxmlformats.org/officeDocument/2006/math" xmlns="" val="1"/>
             </a:ext>
           </a:extLst>
         </p:spPr>
@@ -33226,7 +33712,7 @@
           </a:ln>
           <a:extLst>
             <a:ext uri="{C572A759-6A51-4108-AA02-DFA0A04FC94B}">
-              <ma14:wrappingTextBoxFlag xmlns="" xmlns:m="http://schemas.openxmlformats.org/officeDocument/2006/math" xmlns:a14="http://schemas.microsoft.com/office/drawing/2010/main" xmlns:ma14="http://schemas.microsoft.com/office/mac/drawingml/2011/main" val="1"/>
+              <ma14:wrappingTextBoxFlag xmlns:ma14="http://schemas.microsoft.com/office/mac/drawingml/2011/main" xmlns:a14="http://schemas.microsoft.com/office/drawing/2010/main" xmlns:m="http://schemas.openxmlformats.org/officeDocument/2006/math" xmlns="" val="1"/>
             </a:ext>
           </a:extLst>
         </p:spPr>
@@ -33339,7 +33825,7 @@
           </a:ln>
           <a:extLst>
             <a:ext uri="{C572A759-6A51-4108-AA02-DFA0A04FC94B}">
-              <ma14:wrappingTextBoxFlag xmlns="" xmlns:m="http://schemas.openxmlformats.org/officeDocument/2006/math" xmlns:a14="http://schemas.microsoft.com/office/drawing/2010/main" xmlns:ma14="http://schemas.microsoft.com/office/mac/drawingml/2011/main" val="1"/>
+              <ma14:wrappingTextBoxFlag xmlns:ma14="http://schemas.microsoft.com/office/mac/drawingml/2011/main" xmlns:a14="http://schemas.microsoft.com/office/drawing/2010/main" xmlns:m="http://schemas.openxmlformats.org/officeDocument/2006/math" xmlns="" val="1"/>
             </a:ext>
           </a:extLst>
         </p:spPr>
@@ -33382,7 +33868,7 @@
           </a:ln>
           <a:extLst>
             <a:ext uri="{C572A759-6A51-4108-AA02-DFA0A04FC94B}">
-              <ma14:wrappingTextBoxFlag xmlns="" xmlns:m="http://schemas.openxmlformats.org/officeDocument/2006/math" xmlns:a14="http://schemas.microsoft.com/office/drawing/2010/main" xmlns:ma14="http://schemas.microsoft.com/office/mac/drawingml/2011/main" val="1"/>
+              <ma14:wrappingTextBoxFlag xmlns:ma14="http://schemas.microsoft.com/office/mac/drawingml/2011/main" xmlns:a14="http://schemas.microsoft.com/office/drawing/2010/main" xmlns:m="http://schemas.openxmlformats.org/officeDocument/2006/math" xmlns="" val="1"/>
             </a:ext>
           </a:extLst>
         </p:spPr>
@@ -33462,7 +33948,7 @@
           </a:ln>
           <a:extLst>
             <a:ext uri="{C572A759-6A51-4108-AA02-DFA0A04FC94B}">
-              <ma14:wrappingTextBoxFlag xmlns="" xmlns:m="http://schemas.openxmlformats.org/officeDocument/2006/math" xmlns:a14="http://schemas.microsoft.com/office/drawing/2010/main" xmlns:ma14="http://schemas.microsoft.com/office/mac/drawingml/2011/main" val="1"/>
+              <ma14:wrappingTextBoxFlag xmlns:ma14="http://schemas.microsoft.com/office/mac/drawingml/2011/main" xmlns:a14="http://schemas.microsoft.com/office/drawing/2010/main" xmlns:m="http://schemas.openxmlformats.org/officeDocument/2006/math" xmlns="" val="1"/>
             </a:ext>
           </a:extLst>
         </p:spPr>
@@ -33536,7 +34022,7 @@
           </a:ln>
           <a:extLst>
             <a:ext uri="{C572A759-6A51-4108-AA02-DFA0A04FC94B}">
-              <ma14:wrappingTextBoxFlag xmlns="" xmlns:m="http://schemas.openxmlformats.org/officeDocument/2006/math" xmlns:a14="http://schemas.microsoft.com/office/drawing/2010/main" xmlns:ma14="http://schemas.microsoft.com/office/mac/drawingml/2011/main" val="1"/>
+              <ma14:wrappingTextBoxFlag xmlns:ma14="http://schemas.microsoft.com/office/mac/drawingml/2011/main" xmlns:a14="http://schemas.microsoft.com/office/drawing/2010/main" xmlns:m="http://schemas.openxmlformats.org/officeDocument/2006/math" xmlns="" val="1"/>
             </a:ext>
           </a:extLst>
         </p:spPr>
@@ -33579,7 +34065,7 @@
           </a:ln>
           <a:extLst>
             <a:ext uri="{C572A759-6A51-4108-AA02-DFA0A04FC94B}">
-              <ma14:wrappingTextBoxFlag xmlns="" xmlns:m="http://schemas.openxmlformats.org/officeDocument/2006/math" xmlns:a14="http://schemas.microsoft.com/office/drawing/2010/main" xmlns:ma14="http://schemas.microsoft.com/office/mac/drawingml/2011/main" val="1"/>
+              <ma14:wrappingTextBoxFlag xmlns:ma14="http://schemas.microsoft.com/office/mac/drawingml/2011/main" xmlns:a14="http://schemas.microsoft.com/office/drawing/2010/main" xmlns:m="http://schemas.openxmlformats.org/officeDocument/2006/math" xmlns="" val="1"/>
             </a:ext>
           </a:extLst>
         </p:spPr>
@@ -34266,7 +34752,7 @@
           </a:ln>
           <a:extLst>
             <a:ext uri="{C572A759-6A51-4108-AA02-DFA0A04FC94B}">
-              <ma14:wrappingTextBoxFlag xmlns="" xmlns:m="http://schemas.openxmlformats.org/officeDocument/2006/math" xmlns:a14="http://schemas.microsoft.com/office/drawing/2010/main" xmlns:ma14="http://schemas.microsoft.com/office/mac/drawingml/2011/main" val="1"/>
+              <ma14:wrappingTextBoxFlag xmlns:ma14="http://schemas.microsoft.com/office/mac/drawingml/2011/main" xmlns:a14="http://schemas.microsoft.com/office/drawing/2010/main" xmlns:m="http://schemas.openxmlformats.org/officeDocument/2006/math" xmlns="" val="1"/>
             </a:ext>
           </a:extLst>
         </p:spPr>
@@ -34348,7 +34834,7 @@
           </a:ln>
           <a:extLst>
             <a:ext uri="{C572A759-6A51-4108-AA02-DFA0A04FC94B}">
-              <ma14:wrappingTextBoxFlag xmlns="" xmlns:m="http://schemas.openxmlformats.org/officeDocument/2006/math" xmlns:a14="http://schemas.microsoft.com/office/drawing/2010/main" xmlns:ma14="http://schemas.microsoft.com/office/mac/drawingml/2011/main" val="1"/>
+              <ma14:wrappingTextBoxFlag xmlns:ma14="http://schemas.microsoft.com/office/mac/drawingml/2011/main" xmlns:a14="http://schemas.microsoft.com/office/drawing/2010/main" xmlns:m="http://schemas.openxmlformats.org/officeDocument/2006/math" xmlns="" val="1"/>
             </a:ext>
           </a:extLst>
         </p:spPr>
@@ -36410,7 +36896,7 @@
           </a:ln>
           <a:extLst>
             <a:ext uri="{C572A759-6A51-4108-AA02-DFA0A04FC94B}">
-              <ma14:wrappingTextBoxFlag xmlns="" xmlns:m="http://schemas.openxmlformats.org/officeDocument/2006/math" xmlns:a14="http://schemas.microsoft.com/office/drawing/2010/main" xmlns:ma14="http://schemas.microsoft.com/office/mac/drawingml/2011/main" val="1"/>
+              <ma14:wrappingTextBoxFlag xmlns:ma14="http://schemas.microsoft.com/office/mac/drawingml/2011/main" xmlns:a14="http://schemas.microsoft.com/office/drawing/2010/main" xmlns:m="http://schemas.openxmlformats.org/officeDocument/2006/math" xmlns="" val="1"/>
             </a:ext>
           </a:extLst>
         </p:spPr>
@@ -37922,7 +38408,7 @@
           </a:ln>
           <a:extLst>
             <a:ext uri="{C572A759-6A51-4108-AA02-DFA0A04FC94B}">
-              <ma14:wrappingTextBoxFlag xmlns="" xmlns:m="http://schemas.openxmlformats.org/officeDocument/2006/math" xmlns:a14="http://schemas.microsoft.com/office/drawing/2010/main" xmlns:ma14="http://schemas.microsoft.com/office/mac/drawingml/2011/main" val="1"/>
+              <ma14:wrappingTextBoxFlag xmlns:ma14="http://schemas.microsoft.com/office/mac/drawingml/2011/main" xmlns:a14="http://schemas.microsoft.com/office/drawing/2010/main" xmlns:m="http://schemas.openxmlformats.org/officeDocument/2006/math" xmlns="" val="1"/>
             </a:ext>
           </a:extLst>
         </p:spPr>
@@ -37975,7 +38461,7 @@
           </a:ln>
           <a:extLst>
             <a:ext uri="{C572A759-6A51-4108-AA02-DFA0A04FC94B}">
-              <ma14:wrappingTextBoxFlag xmlns="" xmlns:m="http://schemas.openxmlformats.org/officeDocument/2006/math" xmlns:a14="http://schemas.microsoft.com/office/drawing/2010/main" xmlns:ma14="http://schemas.microsoft.com/office/mac/drawingml/2011/main" val="1"/>
+              <ma14:wrappingTextBoxFlag xmlns:ma14="http://schemas.microsoft.com/office/mac/drawingml/2011/main" xmlns:a14="http://schemas.microsoft.com/office/drawing/2010/main" xmlns:m="http://schemas.openxmlformats.org/officeDocument/2006/math" xmlns="" val="1"/>
             </a:ext>
           </a:extLst>
         </p:spPr>
@@ -38072,7 +38558,7 @@
           </a:ln>
           <a:extLst>
             <a:ext uri="{C572A759-6A51-4108-AA02-DFA0A04FC94B}">
-              <ma14:wrappingTextBoxFlag xmlns="" xmlns:m="http://schemas.openxmlformats.org/officeDocument/2006/math" xmlns:a14="http://schemas.microsoft.com/office/drawing/2010/main" xmlns:ma14="http://schemas.microsoft.com/office/mac/drawingml/2011/main" val="1"/>
+              <ma14:wrappingTextBoxFlag xmlns:ma14="http://schemas.microsoft.com/office/mac/drawingml/2011/main" xmlns:a14="http://schemas.microsoft.com/office/drawing/2010/main" xmlns:m="http://schemas.openxmlformats.org/officeDocument/2006/math" xmlns="" val="1"/>
             </a:ext>
           </a:extLst>
         </p:spPr>
@@ -38125,7 +38611,7 @@
           </a:ln>
           <a:extLst>
             <a:ext uri="{C572A759-6A51-4108-AA02-DFA0A04FC94B}">
-              <ma14:wrappingTextBoxFlag xmlns="" xmlns:m="http://schemas.openxmlformats.org/officeDocument/2006/math" xmlns:a14="http://schemas.microsoft.com/office/drawing/2010/main" xmlns:ma14="http://schemas.microsoft.com/office/mac/drawingml/2011/main" val="1"/>
+              <ma14:wrappingTextBoxFlag xmlns:ma14="http://schemas.microsoft.com/office/mac/drawingml/2011/main" xmlns:a14="http://schemas.microsoft.com/office/drawing/2010/main" xmlns:m="http://schemas.openxmlformats.org/officeDocument/2006/math" xmlns="" val="1"/>
             </a:ext>
           </a:extLst>
         </p:spPr>
@@ -38222,7 +38708,7 @@
           </a:ln>
           <a:extLst>
             <a:ext uri="{C572A759-6A51-4108-AA02-DFA0A04FC94B}">
-              <ma14:wrappingTextBoxFlag xmlns="" xmlns:m="http://schemas.openxmlformats.org/officeDocument/2006/math" xmlns:a14="http://schemas.microsoft.com/office/drawing/2010/main" xmlns:ma14="http://schemas.microsoft.com/office/mac/drawingml/2011/main" val="1"/>
+              <ma14:wrappingTextBoxFlag xmlns:ma14="http://schemas.microsoft.com/office/mac/drawingml/2011/main" xmlns:a14="http://schemas.microsoft.com/office/drawing/2010/main" xmlns:m="http://schemas.openxmlformats.org/officeDocument/2006/math" xmlns="" val="1"/>
             </a:ext>
           </a:extLst>
         </p:spPr>
@@ -38275,7 +38761,7 @@
           </a:ln>
           <a:extLst>
             <a:ext uri="{C572A759-6A51-4108-AA02-DFA0A04FC94B}">
-              <ma14:wrappingTextBoxFlag xmlns="" xmlns:m="http://schemas.openxmlformats.org/officeDocument/2006/math" xmlns:a14="http://schemas.microsoft.com/office/drawing/2010/main" xmlns:ma14="http://schemas.microsoft.com/office/mac/drawingml/2011/main" val="1"/>
+              <ma14:wrappingTextBoxFlag xmlns:ma14="http://schemas.microsoft.com/office/mac/drawingml/2011/main" xmlns:a14="http://schemas.microsoft.com/office/drawing/2010/main" xmlns:m="http://schemas.openxmlformats.org/officeDocument/2006/math" xmlns="" val="1"/>
             </a:ext>
           </a:extLst>
         </p:spPr>
@@ -38417,7 +38903,7 @@
           </a:ln>
           <a:extLst>
             <a:ext uri="{C572A759-6A51-4108-AA02-DFA0A04FC94B}">
-              <ma14:wrappingTextBoxFlag xmlns="" xmlns:m="http://schemas.openxmlformats.org/officeDocument/2006/math" xmlns:a14="http://schemas.microsoft.com/office/drawing/2010/main" xmlns:ma14="http://schemas.microsoft.com/office/mac/drawingml/2011/main" val="1"/>
+              <ma14:wrappingTextBoxFlag xmlns:ma14="http://schemas.microsoft.com/office/mac/drawingml/2011/main" xmlns:a14="http://schemas.microsoft.com/office/drawing/2010/main" xmlns:m="http://schemas.openxmlformats.org/officeDocument/2006/math" xmlns="" val="1"/>
             </a:ext>
           </a:extLst>
         </p:spPr>
@@ -38470,7 +38956,7 @@
           </a:ln>
           <a:extLst>
             <a:ext uri="{C572A759-6A51-4108-AA02-DFA0A04FC94B}">
-              <ma14:wrappingTextBoxFlag xmlns="" xmlns:m="http://schemas.openxmlformats.org/officeDocument/2006/math" xmlns:a14="http://schemas.microsoft.com/office/drawing/2010/main" xmlns:ma14="http://schemas.microsoft.com/office/mac/drawingml/2011/main" val="1"/>
+              <ma14:wrappingTextBoxFlag xmlns:ma14="http://schemas.microsoft.com/office/mac/drawingml/2011/main" xmlns:a14="http://schemas.microsoft.com/office/drawing/2010/main" xmlns:m="http://schemas.openxmlformats.org/officeDocument/2006/math" xmlns="" val="1"/>
             </a:ext>
           </a:extLst>
         </p:spPr>
@@ -38632,7 +39118,7 @@
             <a:effectLst/>
             <a:extLst>
               <a:ext uri="{C572A759-6A51-4108-AA02-DFA0A04FC94B}">
-                <ma14:wrappingTextBoxFlag xmlns="" xmlns:m="http://schemas.openxmlformats.org/officeDocument/2006/math" xmlns:a14="http://schemas.microsoft.com/office/drawing/2010/main" xmlns:ma14="http://schemas.microsoft.com/office/mac/drawingml/2011/main" val="1"/>
+                <ma14:wrappingTextBoxFlag xmlns:ma14="http://schemas.microsoft.com/office/mac/drawingml/2011/main" xmlns:a14="http://schemas.microsoft.com/office/drawing/2010/main" xmlns:m="http://schemas.openxmlformats.org/officeDocument/2006/math" xmlns="" val="1"/>
               </a:ext>
             </a:extLst>
           </p:spPr>
@@ -38684,7 +39170,7 @@
             <a:effectLst/>
             <a:extLst>
               <a:ext uri="{C572A759-6A51-4108-AA02-DFA0A04FC94B}">
-                <ma14:wrappingTextBoxFlag xmlns="" xmlns:m="http://schemas.openxmlformats.org/officeDocument/2006/math" xmlns:a14="http://schemas.microsoft.com/office/drawing/2010/main" xmlns:ma14="http://schemas.microsoft.com/office/mac/drawingml/2011/main" val="1"/>
+                <ma14:wrappingTextBoxFlag xmlns:ma14="http://schemas.microsoft.com/office/mac/drawingml/2011/main" xmlns:a14="http://schemas.microsoft.com/office/drawing/2010/main" xmlns:m="http://schemas.openxmlformats.org/officeDocument/2006/math" xmlns="" val="1"/>
               </a:ext>
             </a:extLst>
           </p:spPr>
@@ -40330,7 +40816,7 @@
           </a:ln>
           <a:extLst>
             <a:ext uri="{C572A759-6A51-4108-AA02-DFA0A04FC94B}">
-              <ma14:wrappingTextBoxFlag xmlns="" xmlns:m="http://schemas.openxmlformats.org/officeDocument/2006/math" xmlns:a14="http://schemas.microsoft.com/office/drawing/2010/main" xmlns:ma14="http://schemas.microsoft.com/office/mac/drawingml/2011/main" val="1"/>
+              <ma14:wrappingTextBoxFlag xmlns:ma14="http://schemas.microsoft.com/office/mac/drawingml/2011/main" xmlns:a14="http://schemas.microsoft.com/office/drawing/2010/main" xmlns:m="http://schemas.openxmlformats.org/officeDocument/2006/math" xmlns="" val="1"/>
             </a:ext>
           </a:extLst>
         </p:spPr>
@@ -40698,7 +41184,7 @@
           </a:ln>
           <a:extLst>
             <a:ext uri="{C572A759-6A51-4108-AA02-DFA0A04FC94B}">
-              <ma14:wrappingTextBoxFlag xmlns="" xmlns:m="http://schemas.openxmlformats.org/officeDocument/2006/math" xmlns:a14="http://schemas.microsoft.com/office/drawing/2010/main" xmlns:ma14="http://schemas.microsoft.com/office/mac/drawingml/2011/main" val="1"/>
+              <ma14:wrappingTextBoxFlag xmlns:ma14="http://schemas.microsoft.com/office/mac/drawingml/2011/main" xmlns:a14="http://schemas.microsoft.com/office/drawing/2010/main" xmlns:m="http://schemas.openxmlformats.org/officeDocument/2006/math" xmlns="" val="1"/>
             </a:ext>
           </a:extLst>
         </p:spPr>
@@ -40751,7 +41237,7 @@
           </a:ln>
           <a:extLst>
             <a:ext uri="{C572A759-6A51-4108-AA02-DFA0A04FC94B}">
-              <ma14:wrappingTextBoxFlag xmlns="" xmlns:m="http://schemas.openxmlformats.org/officeDocument/2006/math" xmlns:a14="http://schemas.microsoft.com/office/drawing/2010/main" xmlns:ma14="http://schemas.microsoft.com/office/mac/drawingml/2011/main" val="1"/>
+              <ma14:wrappingTextBoxFlag xmlns:ma14="http://schemas.microsoft.com/office/mac/drawingml/2011/main" xmlns:a14="http://schemas.microsoft.com/office/drawing/2010/main" xmlns:m="http://schemas.openxmlformats.org/officeDocument/2006/math" xmlns="" val="1"/>
             </a:ext>
           </a:extLst>
         </p:spPr>
@@ -40803,7 +41289,7 @@
           </a:ln>
           <a:extLst>
             <a:ext uri="{C572A759-6A51-4108-AA02-DFA0A04FC94B}">
-              <ma14:wrappingTextBoxFlag xmlns="" xmlns:m="http://schemas.openxmlformats.org/officeDocument/2006/math" xmlns:a14="http://schemas.microsoft.com/office/drawing/2010/main" xmlns:ma14="http://schemas.microsoft.com/office/mac/drawingml/2011/main" val="1"/>
+              <ma14:wrappingTextBoxFlag xmlns:ma14="http://schemas.microsoft.com/office/mac/drawingml/2011/main" xmlns:a14="http://schemas.microsoft.com/office/drawing/2010/main" xmlns:m="http://schemas.openxmlformats.org/officeDocument/2006/math" xmlns="" val="1"/>
             </a:ext>
           </a:extLst>
         </p:spPr>
@@ -40855,7 +41341,7 @@
           </a:ln>
           <a:extLst>
             <a:ext uri="{C572A759-6A51-4108-AA02-DFA0A04FC94B}">
-              <ma14:wrappingTextBoxFlag xmlns="" xmlns:m="http://schemas.openxmlformats.org/officeDocument/2006/math" xmlns:a14="http://schemas.microsoft.com/office/drawing/2010/main" xmlns:ma14="http://schemas.microsoft.com/office/mac/drawingml/2011/main" val="1"/>
+              <ma14:wrappingTextBoxFlag xmlns:ma14="http://schemas.microsoft.com/office/mac/drawingml/2011/main" xmlns:a14="http://schemas.microsoft.com/office/drawing/2010/main" xmlns:m="http://schemas.openxmlformats.org/officeDocument/2006/math" xmlns="" val="1"/>
             </a:ext>
           </a:extLst>
         </p:spPr>
@@ -40907,7 +41393,7 @@
           </a:ln>
           <a:extLst>
             <a:ext uri="{C572A759-6A51-4108-AA02-DFA0A04FC94B}">
-              <ma14:wrappingTextBoxFlag xmlns="" xmlns:m="http://schemas.openxmlformats.org/officeDocument/2006/math" xmlns:a14="http://schemas.microsoft.com/office/drawing/2010/main" xmlns:ma14="http://schemas.microsoft.com/office/mac/drawingml/2011/main" val="1"/>
+              <ma14:wrappingTextBoxFlag xmlns:ma14="http://schemas.microsoft.com/office/mac/drawingml/2011/main" xmlns:a14="http://schemas.microsoft.com/office/drawing/2010/main" xmlns:m="http://schemas.openxmlformats.org/officeDocument/2006/math" xmlns="" val="1"/>
             </a:ext>
           </a:extLst>
         </p:spPr>
@@ -40959,7 +41445,7 @@
           </a:ln>
           <a:extLst>
             <a:ext uri="{C572A759-6A51-4108-AA02-DFA0A04FC94B}">
-              <ma14:wrappingTextBoxFlag xmlns="" xmlns:m="http://schemas.openxmlformats.org/officeDocument/2006/math" xmlns:a14="http://schemas.microsoft.com/office/drawing/2010/main" xmlns:ma14="http://schemas.microsoft.com/office/mac/drawingml/2011/main" val="1"/>
+              <ma14:wrappingTextBoxFlag xmlns:ma14="http://schemas.microsoft.com/office/mac/drawingml/2011/main" xmlns:a14="http://schemas.microsoft.com/office/drawing/2010/main" xmlns:m="http://schemas.openxmlformats.org/officeDocument/2006/math" xmlns="" val="1"/>
             </a:ext>
           </a:extLst>
         </p:spPr>
@@ -41011,7 +41497,7 @@
           </a:ln>
           <a:extLst>
             <a:ext uri="{C572A759-6A51-4108-AA02-DFA0A04FC94B}">
-              <ma14:wrappingTextBoxFlag xmlns="" xmlns:m="http://schemas.openxmlformats.org/officeDocument/2006/math" xmlns:a14="http://schemas.microsoft.com/office/drawing/2010/main" xmlns:ma14="http://schemas.microsoft.com/office/mac/drawingml/2011/main" val="1"/>
+              <ma14:wrappingTextBoxFlag xmlns:ma14="http://schemas.microsoft.com/office/mac/drawingml/2011/main" xmlns:a14="http://schemas.microsoft.com/office/drawing/2010/main" xmlns:m="http://schemas.openxmlformats.org/officeDocument/2006/math" xmlns="" val="1"/>
             </a:ext>
           </a:extLst>
         </p:spPr>
@@ -41063,7 +41549,7 @@
           </a:ln>
           <a:extLst>
             <a:ext uri="{C572A759-6A51-4108-AA02-DFA0A04FC94B}">
-              <ma14:wrappingTextBoxFlag xmlns="" xmlns:m="http://schemas.openxmlformats.org/officeDocument/2006/math" xmlns:a14="http://schemas.microsoft.com/office/drawing/2010/main" xmlns:ma14="http://schemas.microsoft.com/office/mac/drawingml/2011/main" val="1"/>
+              <ma14:wrappingTextBoxFlag xmlns:ma14="http://schemas.microsoft.com/office/mac/drawingml/2011/main" xmlns:a14="http://schemas.microsoft.com/office/drawing/2010/main" xmlns:m="http://schemas.openxmlformats.org/officeDocument/2006/math" xmlns="" val="1"/>
             </a:ext>
           </a:extLst>
         </p:spPr>
@@ -41115,7 +41601,7 @@
           </a:ln>
           <a:extLst>
             <a:ext uri="{C572A759-6A51-4108-AA02-DFA0A04FC94B}">
-              <ma14:wrappingTextBoxFlag xmlns="" xmlns:m="http://schemas.openxmlformats.org/officeDocument/2006/math" xmlns:a14="http://schemas.microsoft.com/office/drawing/2010/main" xmlns:ma14="http://schemas.microsoft.com/office/mac/drawingml/2011/main" val="1"/>
+              <ma14:wrappingTextBoxFlag xmlns:ma14="http://schemas.microsoft.com/office/mac/drawingml/2011/main" xmlns:a14="http://schemas.microsoft.com/office/drawing/2010/main" xmlns:m="http://schemas.openxmlformats.org/officeDocument/2006/math" xmlns="" val="1"/>
             </a:ext>
           </a:extLst>
         </p:spPr>
@@ -42136,7 +42622,7 @@
               <a:effectLst/>
               <a:extLst>
                 <a:ext uri="{C572A759-6A51-4108-AA02-DFA0A04FC94B}">
-                  <ma14:wrappingTextBoxFlag xmlns="" xmlns:m="http://schemas.openxmlformats.org/officeDocument/2006/math" xmlns:a14="http://schemas.microsoft.com/office/drawing/2010/main" xmlns:ma14="http://schemas.microsoft.com/office/mac/drawingml/2011/main" val="1"/>
+                  <ma14:wrappingTextBoxFlag xmlns:ma14="http://schemas.microsoft.com/office/mac/drawingml/2011/main" xmlns:a14="http://schemas.microsoft.com/office/drawing/2010/main" xmlns:m="http://schemas.openxmlformats.org/officeDocument/2006/math" xmlns="" val="1"/>
                 </a:ext>
               </a:extLst>
             </p:spPr>
@@ -42182,7 +42668,7 @@
               <a:effectLst/>
               <a:extLst>
                 <a:ext uri="{C572A759-6A51-4108-AA02-DFA0A04FC94B}">
-                  <ma14:wrappingTextBoxFlag xmlns="" xmlns:m="http://schemas.openxmlformats.org/officeDocument/2006/math" xmlns:a14="http://schemas.microsoft.com/office/drawing/2010/main" xmlns:ma14="http://schemas.microsoft.com/office/mac/drawingml/2011/main" val="1"/>
+                  <ma14:wrappingTextBoxFlag xmlns:ma14="http://schemas.microsoft.com/office/mac/drawingml/2011/main" xmlns:a14="http://schemas.microsoft.com/office/drawing/2010/main" xmlns:m="http://schemas.openxmlformats.org/officeDocument/2006/math" xmlns="" val="1"/>
                 </a:ext>
               </a:extLst>
             </p:spPr>
@@ -42228,7 +42714,7 @@
               <a:effectLst/>
               <a:extLst>
                 <a:ext uri="{C572A759-6A51-4108-AA02-DFA0A04FC94B}">
-                  <ma14:wrappingTextBoxFlag xmlns="" xmlns:m="http://schemas.openxmlformats.org/officeDocument/2006/math" xmlns:a14="http://schemas.microsoft.com/office/drawing/2010/main" xmlns:ma14="http://schemas.microsoft.com/office/mac/drawingml/2011/main" val="1"/>
+                  <ma14:wrappingTextBoxFlag xmlns:ma14="http://schemas.microsoft.com/office/mac/drawingml/2011/main" xmlns:a14="http://schemas.microsoft.com/office/drawing/2010/main" xmlns:m="http://schemas.openxmlformats.org/officeDocument/2006/math" xmlns="" val="1"/>
                 </a:ext>
               </a:extLst>
             </p:spPr>
@@ -42274,7 +42760,7 @@
               <a:effectLst/>
               <a:extLst>
                 <a:ext uri="{C572A759-6A51-4108-AA02-DFA0A04FC94B}">
-                  <ma14:wrappingTextBoxFlag xmlns="" xmlns:m="http://schemas.openxmlformats.org/officeDocument/2006/math" xmlns:a14="http://schemas.microsoft.com/office/drawing/2010/main" xmlns:ma14="http://schemas.microsoft.com/office/mac/drawingml/2011/main" val="1"/>
+                  <ma14:wrappingTextBoxFlag xmlns:ma14="http://schemas.microsoft.com/office/mac/drawingml/2011/main" xmlns:a14="http://schemas.microsoft.com/office/drawing/2010/main" xmlns:m="http://schemas.openxmlformats.org/officeDocument/2006/math" xmlns="" val="1"/>
                 </a:ext>
               </a:extLst>
             </p:spPr>
@@ -42629,7 +43115,7 @@
               <a:effectLst/>
               <a:extLst>
                 <a:ext uri="{C572A759-6A51-4108-AA02-DFA0A04FC94B}">
-                  <ma14:wrappingTextBoxFlag xmlns="" xmlns:m="http://schemas.openxmlformats.org/officeDocument/2006/math" xmlns:a14="http://schemas.microsoft.com/office/drawing/2010/main" xmlns:ma14="http://schemas.microsoft.com/office/mac/drawingml/2011/main" val="1"/>
+                  <ma14:wrappingTextBoxFlag xmlns:ma14="http://schemas.microsoft.com/office/mac/drawingml/2011/main" xmlns:a14="http://schemas.microsoft.com/office/drawing/2010/main" xmlns:m="http://schemas.openxmlformats.org/officeDocument/2006/math" xmlns="" val="1"/>
                 </a:ext>
               </a:extLst>
             </p:spPr>
@@ -42675,7 +43161,7 @@
               <a:effectLst/>
               <a:extLst>
                 <a:ext uri="{C572A759-6A51-4108-AA02-DFA0A04FC94B}">
-                  <ma14:wrappingTextBoxFlag xmlns="" xmlns:m="http://schemas.openxmlformats.org/officeDocument/2006/math" xmlns:a14="http://schemas.microsoft.com/office/drawing/2010/main" xmlns:ma14="http://schemas.microsoft.com/office/mac/drawingml/2011/main" val="1"/>
+                  <ma14:wrappingTextBoxFlag xmlns:ma14="http://schemas.microsoft.com/office/mac/drawingml/2011/main" xmlns:a14="http://schemas.microsoft.com/office/drawing/2010/main" xmlns:m="http://schemas.openxmlformats.org/officeDocument/2006/math" xmlns="" val="1"/>
                 </a:ext>
               </a:extLst>
             </p:spPr>
@@ -42721,7 +43207,7 @@
               <a:effectLst/>
               <a:extLst>
                 <a:ext uri="{C572A759-6A51-4108-AA02-DFA0A04FC94B}">
-                  <ma14:wrappingTextBoxFlag xmlns="" xmlns:m="http://schemas.openxmlformats.org/officeDocument/2006/math" xmlns:a14="http://schemas.microsoft.com/office/drawing/2010/main" xmlns:ma14="http://schemas.microsoft.com/office/mac/drawingml/2011/main" val="1"/>
+                  <ma14:wrappingTextBoxFlag xmlns:ma14="http://schemas.microsoft.com/office/mac/drawingml/2011/main" xmlns:a14="http://schemas.microsoft.com/office/drawing/2010/main" xmlns:m="http://schemas.openxmlformats.org/officeDocument/2006/math" xmlns="" val="1"/>
                 </a:ext>
               </a:extLst>
             </p:spPr>
@@ -43181,7 +43667,7 @@
               <a:effectLst/>
               <a:extLst>
                 <a:ext uri="{C572A759-6A51-4108-AA02-DFA0A04FC94B}">
-                  <ma14:wrappingTextBoxFlag xmlns="" xmlns:m="http://schemas.openxmlformats.org/officeDocument/2006/math" xmlns:a14="http://schemas.microsoft.com/office/drawing/2010/main" xmlns:ma14="http://schemas.microsoft.com/office/mac/drawingml/2011/main" val="1"/>
+                  <ma14:wrappingTextBoxFlag xmlns:ma14="http://schemas.microsoft.com/office/mac/drawingml/2011/main" xmlns:a14="http://schemas.microsoft.com/office/drawing/2010/main" xmlns:m="http://schemas.openxmlformats.org/officeDocument/2006/math" xmlns="" val="1"/>
                 </a:ext>
               </a:extLst>
             </p:spPr>
@@ -43227,7 +43713,7 @@
               <a:effectLst/>
               <a:extLst>
                 <a:ext uri="{C572A759-6A51-4108-AA02-DFA0A04FC94B}">
-                  <ma14:wrappingTextBoxFlag xmlns="" xmlns:m="http://schemas.openxmlformats.org/officeDocument/2006/math" xmlns:a14="http://schemas.microsoft.com/office/drawing/2010/main" xmlns:ma14="http://schemas.microsoft.com/office/mac/drawingml/2011/main" val="1"/>
+                  <ma14:wrappingTextBoxFlag xmlns:ma14="http://schemas.microsoft.com/office/mac/drawingml/2011/main" xmlns:a14="http://schemas.microsoft.com/office/drawing/2010/main" xmlns:m="http://schemas.openxmlformats.org/officeDocument/2006/math" xmlns="" val="1"/>
                 </a:ext>
               </a:extLst>
             </p:spPr>
@@ -43273,7 +43759,7 @@
               <a:effectLst/>
               <a:extLst>
                 <a:ext uri="{C572A759-6A51-4108-AA02-DFA0A04FC94B}">
-                  <ma14:wrappingTextBoxFlag xmlns="" xmlns:m="http://schemas.openxmlformats.org/officeDocument/2006/math" xmlns:a14="http://schemas.microsoft.com/office/drawing/2010/main" xmlns:ma14="http://schemas.microsoft.com/office/mac/drawingml/2011/main" val="1"/>
+                  <ma14:wrappingTextBoxFlag xmlns:ma14="http://schemas.microsoft.com/office/mac/drawingml/2011/main" xmlns:a14="http://schemas.microsoft.com/office/drawing/2010/main" xmlns:m="http://schemas.openxmlformats.org/officeDocument/2006/math" xmlns="" val="1"/>
                 </a:ext>
               </a:extLst>
             </p:spPr>
@@ -43319,7 +43805,7 @@
               <a:effectLst/>
               <a:extLst>
                 <a:ext uri="{C572A759-6A51-4108-AA02-DFA0A04FC94B}">
-                  <ma14:wrappingTextBoxFlag xmlns="" xmlns:m="http://schemas.openxmlformats.org/officeDocument/2006/math" xmlns:a14="http://schemas.microsoft.com/office/drawing/2010/main" xmlns:ma14="http://schemas.microsoft.com/office/mac/drawingml/2011/main" val="1"/>
+                  <ma14:wrappingTextBoxFlag xmlns:ma14="http://schemas.microsoft.com/office/mac/drawingml/2011/main" xmlns:a14="http://schemas.microsoft.com/office/drawing/2010/main" xmlns:m="http://schemas.openxmlformats.org/officeDocument/2006/math" xmlns="" val="1"/>
                 </a:ext>
               </a:extLst>
             </p:spPr>
@@ -44658,7 +45144,7 @@
             <a:effectLst/>
             <a:extLst>
               <a:ext uri="{C572A759-6A51-4108-AA02-DFA0A04FC94B}">
-                <ma14:wrappingTextBoxFlag xmlns="" xmlns:m="http://schemas.openxmlformats.org/officeDocument/2006/math" xmlns:a14="http://schemas.microsoft.com/office/drawing/2010/main" xmlns:ma14="http://schemas.microsoft.com/office/mac/drawingml/2011/main" val="1"/>
+                <ma14:wrappingTextBoxFlag xmlns:ma14="http://schemas.microsoft.com/office/mac/drawingml/2011/main" xmlns:a14="http://schemas.microsoft.com/office/drawing/2010/main" xmlns:m="http://schemas.openxmlformats.org/officeDocument/2006/math" xmlns="" val="1"/>
               </a:ext>
             </a:extLst>
           </p:spPr>
@@ -44781,7 +45267,7 @@
           </a:ln>
           <a:extLst>
             <a:ext uri="{C572A759-6A51-4108-AA02-DFA0A04FC94B}">
-              <ma14:wrappingTextBoxFlag xmlns="" xmlns:m="http://schemas.openxmlformats.org/officeDocument/2006/math" xmlns:a14="http://schemas.microsoft.com/office/drawing/2010/main" xmlns:ma14="http://schemas.microsoft.com/office/mac/drawingml/2011/main" val="1"/>
+              <ma14:wrappingTextBoxFlag xmlns:ma14="http://schemas.microsoft.com/office/mac/drawingml/2011/main" xmlns:a14="http://schemas.microsoft.com/office/drawing/2010/main" xmlns:m="http://schemas.openxmlformats.org/officeDocument/2006/math" xmlns="" val="1"/>
             </a:ext>
           </a:extLst>
         </p:spPr>
@@ -54253,7 +54739,7 @@
           </a:ln>
           <a:extLst>
             <a:ext uri="{C572A759-6A51-4108-AA02-DFA0A04FC94B}">
-              <ma14:wrappingTextBoxFlag xmlns="" xmlns:m="http://schemas.openxmlformats.org/officeDocument/2006/math" xmlns:a14="http://schemas.microsoft.com/office/drawing/2010/main" xmlns:ma14="http://schemas.microsoft.com/office/mac/drawingml/2011/main" val="1"/>
+              <ma14:wrappingTextBoxFlag xmlns:ma14="http://schemas.microsoft.com/office/mac/drawingml/2011/main" xmlns:a14="http://schemas.microsoft.com/office/drawing/2010/main" xmlns:m="http://schemas.openxmlformats.org/officeDocument/2006/math" xmlns="" val="1"/>
             </a:ext>
           </a:extLst>
         </p:spPr>

</xml_diff>